<commit_message>
first committed by gram17, 25/06/10
</commit_message>
<xml_diff>
--- a/generated_ppt.pptx
+++ b/generated_ppt.pptx
@@ -27,6 +27,13 @@
     <p:sldId id="275" r:id="rId26"/>
     <p:sldId id="276" r:id="rId27"/>
     <p:sldId id="277" r:id="rId28"/>
+    <p:sldId id="278" r:id="rId29"/>
+    <p:sldId id="279" r:id="rId30"/>
+    <p:sldId id="280" r:id="rId31"/>
+    <p:sldId id="281" r:id="rId32"/>
+    <p:sldId id="282" r:id="rId33"/>
+    <p:sldId id="283" r:id="rId34"/>
+    <p:sldId id="284" r:id="rId35"/>
   </p:sldIdLst>
   <p:sldSz cx="9144000" cy="6858000" type="screen4x3"/>
   <p:notesSz cx="6858000" cy="9144000"/>
@@ -3204,7 +3211,7 @@
               <a:rPr sz="1800">
                 <a:latin typeface="맑은 고딕"/>
               </a:rPr>
-              <a:t>제안요청사항 - 요구사항 총괄 (계속)</a:t>
+              <a:t>제안요청사항 - 요구사항 총괄</a:t>
             </a:r>
           </a:p>
         </p:txBody>
@@ -3228,47 +3235,7 @@
               <a:rPr sz="1200">
                 <a:latin typeface="맑은 고딕"/>
               </a:rPr>
-              <a:t>- 일일 트랜잭션 처리량 한도 (예: 10,000 트랜잭션/분).</a:t>
-            </a:r>
-          </a:p>
-          <a:p>
-            <a:r>
-              <a:rPr sz="1200">
-                <a:latin typeface="맑은 고딕"/>
-              </a:rPr>
-              <a:t>  - **요구사항 번호**: PR02</a:t>
-            </a:r>
-          </a:p>
-          <a:p>
-            <a:r>
-              <a:rPr sz="1200">
-                <a:latin typeface="맑은 고딕"/>
-              </a:rPr>
-              <a:t>    - **설명**: 가용성 및 동적 용량 요구 사항 - 시스템의 안정적인 운영을 위한 요구사항 명시.</a:t>
-            </a:r>
-          </a:p>
-          <a:p>
-            <a:r>
-              <a:rPr sz="1200">
-                <a:latin typeface="맑은 고딕"/>
-              </a:rPr>
-              <a:t>      - **세부 내용**:</a:t>
-            </a:r>
-          </a:p>
-          <a:p>
-            <a:r>
-              <a:rPr sz="1200">
-                <a:latin typeface="맑은 고딕"/>
-              </a:rPr>
-              <a:t>        - 서비스 가용률 목표 설정 (예: 99.9% 이상).</a:t>
-            </a:r>
-          </a:p>
-          <a:p>
-            <a:r>
-              <a:rPr sz="1200">
-                <a:latin typeface="맑은 고딕"/>
-              </a:rPr>
-              <a:t>        - 재난 복구 계획과 자동화된 모니터링 시스템 구축 필요성 포함.</a:t>
+              <a:t>### 요구사항 총괄표 (Health Insurance System Proposal for Bahrain)</a:t>
             </a:r>
           </a:p>
           <a:p/>
@@ -3277,95 +3244,15 @@
               <a:rPr sz="1200">
                 <a:latin typeface="맑은 고딕"/>
               </a:rPr>
-              <a:t>#### 4. 인터페이스 요구사항 (Interface Requirements)</a:t>
-            </a:r>
-          </a:p>
-          <a:p>
-            <a:r>
-              <a:rPr sz="1200">
-                <a:latin typeface="맑은 고딕"/>
-              </a:rPr>
-              <a:t>- **요구사항 번호**: IR01</a:t>
-            </a:r>
-          </a:p>
-          <a:p>
-            <a:r>
-              <a:rPr sz="1200">
-                <a:latin typeface="맑은 고딕"/>
-              </a:rPr>
-              <a:t>  - **설명**: 외부 통합 시스템 및 사용자 인터페이스 요구 사항 - 다양한 시스템 간의 상호 작용을 위한 인터페이스 정의.</a:t>
-            </a:r>
-          </a:p>
-          <a:p>
-            <a:r>
-              <a:rPr sz="1200">
-                <a:latin typeface="맑은 고딕"/>
-              </a:rPr>
-              <a:t>    - **세부 내용**:</a:t>
-            </a:r>
-          </a:p>
-          <a:p>
-            <a:r>
-              <a:rPr sz="1200">
-                <a:latin typeface="맑은 고딕"/>
-              </a:rPr>
-              <a:t>      - API 엔드포인트 정의 및 문서화 (예: RESTful API).</a:t>
-            </a:r>
-          </a:p>
-          <a:p>
-            <a:r>
-              <a:rPr sz="1200">
-                <a:latin typeface="맑은 고딕"/>
-              </a:rPr>
-              <a:t>      - 표준 프로토콜 준수 (HTTP/HTTPS, SOAP 등).</a:t>
-            </a:r>
-          </a:p>
-          <a:p>
-            <a:r>
-              <a:rPr sz="1200">
-                <a:latin typeface="맑은 고딕"/>
-              </a:rPr>
-              <a:t>      - 데이터 교환 형식 및 보안 메커니즘 명시 (JSON Web Tokens 사용 권장).</a:t>
-            </a:r>
-          </a:p>
-          <a:p>
-            <a:r>
-              <a:rPr sz="1200">
-                <a:latin typeface="맑은 고딕"/>
-              </a:rPr>
-              <a:t>  - **요구사항 번호**: IR02</a:t>
-            </a:r>
-          </a:p>
-          <a:p>
-            <a:r>
-              <a:rPr sz="1200">
-                <a:latin typeface="맑은 고딕"/>
-              </a:rPr>
-              <a:t>    - **설명**: 사용자 편의성 및 화면 설계 요구 사항 - 직관적이고 효율적인 사용자 경험 제공.</a:t>
-            </a:r>
-          </a:p>
-          <a:p>
-            <a:r>
-              <a:rPr sz="1200">
-                <a:latin typeface="맑은 고딕"/>
-              </a:rPr>
-              <a:t>      - **세부 내용**:</a:t>
-            </a:r>
-          </a:p>
-          <a:p>
-            <a:r>
-              <a:rPr sz="1200">
-                <a:latin typeface="맑은 고딕"/>
-              </a:rPr>
-              <a:t>        - 반응형 디자인 적용으로 다양한 디바이스에서의 호환성 보장.</a:t>
-            </a:r>
-          </a:p>
-          <a:p>
-            <a:r>
-              <a:rPr sz="1200">
-                <a:latin typeface="맑은 고딕"/>
-              </a:rPr>
-              <a:t>        - 사용자 인터페이스 가이드라인 및 테스트 케이스 포함.</a:t>
+              <a:t>#### 1. 기능 요구 사항</a:t>
+            </a:r>
+          </a:p>
+          <a:p>
+            <a:r>
+              <a:rPr sz="1200">
+                <a:latin typeface="맑은 고딕"/>
+              </a:rPr>
+              <a:t>**목표:** 시스템이 반드시 수행해야 하거나 사용자가 반드시 이용 가능한 핵심 기능들을 명시합니다.</a:t>
             </a:r>
           </a:p>
           <a:p/>
@@ -3374,15 +3261,31 @@
               <a:rPr sz="1200">
                 <a:latin typeface="맑은 고딕"/>
               </a:rPr>
-              <a:t>#### 5. 데이터 요구사항 (Data Requirements)</a:t>
-            </a:r>
-          </a:p>
-          <a:p>
-            <a:r>
-              <a:rPr sz="1200">
-                <a:latin typeface="맑은 고딕"/>
-              </a:rPr>
-              <a:t>- **요구사항 번호**: DR01</a:t>
+              <a:t>| **번호** | **기능 명**               | **설명**                                                                                           | **예상 개수** |</a:t>
+            </a:r>
+          </a:p>
+          <a:p>
+            <a:r>
+              <a:rPr sz="1200">
+                <a:latin typeface="맑은 고딕"/>
+              </a:rPr>
+              <a:t>|----------|----------------------------|----------------------------------------------------------------------------------------------------|--------------|</a:t>
+            </a:r>
+          </a:p>
+          <a:p>
+            <a:r>
+              <a:rPr sz="1200">
+                <a:latin typeface="맑은 고딕"/>
+              </a:rPr>
+              <a:t>| 1        | **회원 가입 및 로그인**   | 사용자 등록 및 안전한 로그인 기능 구현.&lt;br&gt;인증 메커니즘: 다중 인증(MFA) 포함                     | 4            |</a:t>
+            </a:r>
+          </a:p>
+          <a:p>
+            <a:r>
+              <a:rPr sz="1200">
+                <a:latin typeface="맑은 고딕"/>
+              </a:rPr>
+              <a:t>| 2        | **보험 상품 선택**         | 다양한 보험 상품을 비교하고 선택할 수 있는 인터페이스 제공                                         | 6            |</a:t>
             </a:r>
           </a:p>
         </p:txBody>
@@ -3448,177 +3351,47 @@
               <a:rPr sz="1200">
                 <a:latin typeface="맑은 고딕"/>
               </a:rPr>
-              <a:t>- **설명**: 초기 자료 구축 및 데이터 이관 방법 - 데이터 관리 전략 명시.</a:t>
-            </a:r>
-          </a:p>
-          <a:p>
-            <a:r>
-              <a:rPr sz="1200">
-                <a:latin typeface="맑은 고딕"/>
-              </a:rPr>
-              <a:t>    - **세부 내용**:</a:t>
-            </a:r>
-          </a:p>
-          <a:p>
-            <a:r>
-              <a:rPr sz="1200">
-                <a:latin typeface="맑은 고딕"/>
-              </a:rPr>
-              <a:t>      - 데이터 마이닝 및 분석을 위한 원시 데이터 수집 계획 포함.</a:t>
-            </a:r>
-          </a:p>
-          <a:p>
-            <a:r>
-              <a:rPr sz="1200">
-                <a:latin typeface="맑은 고딕"/>
-              </a:rPr>
-              <a:t>      - 기존 시스템에서의 데이터 이관 프로세스 정의 및 테스트 계획 수립.</a:t>
-            </a:r>
-          </a:p>
-          <a:p>
-            <a:r>
-              <a:rPr sz="1200">
-                <a:latin typeface="맑은 고딕"/>
-              </a:rPr>
-              <a:t>  - **요구사항 번호**: DR02</a:t>
-            </a:r>
-          </a:p>
-          <a:p>
-            <a:r>
-              <a:rPr sz="1200">
-                <a:latin typeface="맑은 고딕"/>
-              </a:rPr>
-              <a:t>    - **설명**: 보안이 필요한 데이터 유형 명시 - 민감 정보 보호 방안 제시.</a:t>
-            </a:r>
-          </a:p>
-          <a:p>
-            <a:r>
-              <a:rPr sz="1200">
-                <a:latin typeface="맑은 고딕"/>
-              </a:rPr>
-              <a:t>      - **세부 내용**:</a:t>
-            </a:r>
-          </a:p>
-          <a:p>
-            <a:r>
-              <a:rPr sz="1200">
-                <a:latin typeface="맑은 고딕"/>
-              </a:rPr>
-              <a:t>        - 개인 식별 정보 (PII), 의료 기록 등에 대한 암호화 및 접근 제어 정책 명시.</a:t>
-            </a:r>
-          </a:p>
-          <a:p>
-            <a:r>
-              <a:rPr sz="1200">
-                <a:latin typeface="맑은 고딕"/>
-              </a:rPr>
-              <a:t>        - 정기적인 보안 감사 계획 포함.</a:t>
-            </a:r>
-          </a:p>
-          <a:p/>
-          <a:p>
-            <a:r>
-              <a:rPr sz="1200">
-                <a:latin typeface="맑은 고딕"/>
-              </a:rPr>
-              <a:t>#### 6. 테스트 요구사항 (Testing Requirements)</a:t>
-            </a:r>
-          </a:p>
-          <a:p>
-            <a:r>
-              <a:rPr sz="1200">
-                <a:latin typeface="맑은 고딕"/>
-              </a:rPr>
-              <a:t>- **요구사항 번호**: TR01</a:t>
-            </a:r>
-          </a:p>
-          <a:p>
-            <a:r>
-              <a:rPr sz="1200">
-                <a:latin typeface="맑은 고딕"/>
-              </a:rPr>
-              <a:t>  - **설명**: 성능 테스트 요구 사항 - BMT를 통한 장비 검증 방안 명시.</a:t>
-            </a:r>
-          </a:p>
-          <a:p>
-            <a:r>
-              <a:rPr sz="1200">
-                <a:latin typeface="맑은 고딕"/>
-              </a:rPr>
-              <a:t>    - **세부 내용**:</a:t>
-            </a:r>
-          </a:p>
-          <a:p>
-            <a:r>
-              <a:rPr sz="1200">
-                <a:latin typeface="맑은 고딕"/>
-              </a:rPr>
-              <a:t>      - 부하 테스트 및 스트레스 테스트 수행 계획 포함.</a:t>
-            </a:r>
-          </a:p>
-          <a:p>
-            <a:r>
-              <a:rPr sz="1200">
-                <a:latin typeface="맑은 고딕"/>
-              </a:rPr>
-              <a:t>      - 테스트 결과의 재현성 보장을 위한 스크립트 및 가이드라인 제공.</a:t>
-            </a:r>
-          </a:p>
-          <a:p>
-            <a:r>
-              <a:rPr sz="1200">
-                <a:latin typeface="맑은 고딕"/>
-              </a:rPr>
-              <a:t>  - **요구사항 번호**: TR02</a:t>
-            </a:r>
-          </a:p>
-          <a:p>
-            <a:r>
-              <a:rPr sz="1200">
-                <a:latin typeface="맑은 고딕"/>
-              </a:rPr>
-              <a:t>    - **설명**: 시스템 검증 및 품질 보증 요구 사항 - 구축 후 운영 적합성 확인 방안 명시.</a:t>
-            </a:r>
-          </a:p>
-          <a:p>
-            <a:r>
-              <a:rPr sz="1200">
-                <a:latin typeface="맑은 고딕"/>
-              </a:rPr>
-              <a:t>      - **세부 내용**:</a:t>
-            </a:r>
-          </a:p>
-          <a:p>
-            <a:r>
-              <a:rPr sz="1200">
-                <a:latin typeface="맑은 고딕"/>
-              </a:rPr>
-              <a:t>        - 단위 테스트, 통합 테스트, 시스템 테스트의 구체적인 절차 및 기준 제시.</a:t>
-            </a:r>
-          </a:p>
-          <a:p>
-            <a:r>
-              <a:rPr sz="1200">
-                <a:latin typeface="맑은 고딕"/>
-              </a:rPr>
-              <a:t>        - 사용자 피드백 기반의 지속적인 품질 개선 프로세스 포함.</a:t>
-            </a:r>
-          </a:p>
-          <a:p/>
-          <a:p>
-            <a:r>
-              <a:rPr sz="1200">
-                <a:latin typeface="맑은 고딕"/>
-              </a:rPr>
-              <a:t>#### 7. 품질 요구사항 (Quality Requirements)</a:t>
-            </a:r>
-          </a:p>
-          <a:p>
-            <a:r>
-              <a:rPr sz="1200">
-                <a:latin typeface="맑은 고딕"/>
-              </a:rPr>
-              <a:t>- **요구사항 번호**: QR01</a:t>
+              <a:t>| 3        | **청구 및 결제 시스템**    | 실시간 청구 처리 및 안전한 결제 프로세스 구현&lt;br&gt;결제 방법: 카드, 모바일 결제 등 지원             | 5            |</a:t>
+            </a:r>
+          </a:p>
+          <a:p>
+            <a:r>
+              <a:rPr sz="1200">
+                <a:latin typeface="맑은 고딕"/>
+              </a:rPr>
+              <a:t>| 4        | **건강 기록 관리**         | 개인 건강 기록의 업로드와 검색 기능 제공&lt;br&gt;데이터 암호화 및 보안 강화                          | 3            |</a:t>
+            </a:r>
+          </a:p>
+          <a:p>
+            <a:r>
+              <a:rPr sz="1200">
+                <a:latin typeface="맑은 고딕"/>
+              </a:rPr>
+              <a:t>| 5        | **보험 혜택 조회**         | 사용자별 보험 혜택 내역 확인 및 상세 정보 제공                                                   | 4            |</a:t>
+            </a:r>
+          </a:p>
+          <a:p>
+            <a:r>
+              <a:rPr sz="1200">
+                <a:latin typeface="맑은 고딕"/>
+              </a:rPr>
+              <a:t>| 6        | **고객 서비스 채팅봇**     | 실시간 고객 지원을 위한 챗봇 시스템 구축                                                            | 2            |</a:t>
+            </a:r>
+          </a:p>
+          <a:p>
+            <a:r>
+              <a:rPr sz="1200">
+                <a:latin typeface="맑은 고딕"/>
+              </a:rPr>
+              <a:t>| 7        | **보고 및 분석 도구**      | 보험료 통계, 청구 현황 등 다양한 보고서 생성 및 분석 기능 제공                                      | 3            |</a:t>
+            </a:r>
+          </a:p>
+          <a:p>
+            <a:r>
+              <a:rPr sz="1200">
+                <a:latin typeface="맑은 고딕"/>
+              </a:rPr>
+              <a:t>| **총계** | **---**                     | **---**                                                                                             | **57**       |</a:t>
             </a:r>
           </a:p>
         </p:txBody>
@@ -3684,63 +3457,15 @@
               <a:rPr sz="1200">
                 <a:latin typeface="맑은 고딕"/>
               </a:rPr>
-              <a:t>- **설명**: 품질 관리 항목 및 평가 대상 명시 - 체계적인 품질 유지 방안 제시.</a:t>
-            </a:r>
-          </a:p>
-          <a:p>
-            <a:r>
-              <a:rPr sz="1200">
-                <a:latin typeface="맑은 고딕"/>
-              </a:rPr>
-              <a:t>    - **세부 내용**:</a:t>
-            </a:r>
-          </a:p>
-          <a:p>
-            <a:r>
-              <a:rPr sz="1200">
-                <a:latin typeface="맑은 고딕"/>
-              </a:rPr>
-              <a:t>      - ISO 표준 준수 확인 및 인증 획득 계획 포함.</a:t>
-            </a:r>
-          </a:p>
-          <a:p>
-            <a:r>
-              <a:rPr sz="1200">
-                <a:latin typeface="맑은 고딕"/>
-              </a:rPr>
-              <a:t>      - 정기적인 코드 리뷰 및 버그 트래킹 시스템 구축.</a:t>
-            </a:r>
-          </a:p>
-          <a:p>
-            <a:r>
-              <a:rPr sz="1200">
-                <a:latin typeface="맑은 고딕"/>
-              </a:rPr>
-              <a:t>  - **요구사항 번호**: QR02</a:t>
-            </a:r>
-          </a:p>
-          <a:p>
-            <a:r>
-              <a:rPr sz="1200">
-                <a:latin typeface="맑은 고딕"/>
-              </a:rPr>
-              <a:t>    - **설명**: 목표 달성을 위한 품질 지표 정의 - KPIs (Key Performance Indicators) 설정.</a:t>
-            </a:r>
-          </a:p>
-          <a:p>
-            <a:r>
-              <a:rPr sz="1200">
-                <a:latin typeface="맑은 고딕"/>
-              </a:rPr>
-              <a:t>      - **세부 내용**:</a:t>
-            </a:r>
-          </a:p>
-          <a:p>
-            <a:r>
-              <a:rPr sz="1200">
-                <a:latin typeface="맑은 고딕"/>
-              </a:rPr>
-              <a:t>        - 서비스 가용성, 응답 시간, 오류율 등의 구체적인 지표 명시 및 모니터링 방안 제시.</a:t>
+              <a:t>#### 2. 시스템 장비 구성 요구 사항</a:t>
+            </a:r>
+          </a:p>
+          <a:p>
+            <a:r>
+              <a:rPr sz="1200">
+                <a:latin typeface="맑은 고딕"/>
+              </a:rPr>
+              <a:t>**목표:** 프로젝트 수행에 필요한 하드웨어 및 소프트웨어 장비 목록을 정의합니다.</a:t>
             </a:r>
           </a:p>
           <a:p/>
@@ -3749,104 +3474,63 @@
               <a:rPr sz="1200">
                 <a:latin typeface="맑은 고딕"/>
               </a:rPr>
-              <a:t>#### 8. 보안 요구사항 (Security Requirements)</a:t>
-            </a:r>
-          </a:p>
-          <a:p>
-            <a:r>
-              <a:rPr sz="1200">
-                <a:latin typeface="맑은 고딕"/>
-              </a:rPr>
-              <a:t>- **요구사항 번호**: SR01</a:t>
-            </a:r>
-          </a:p>
-          <a:p>
-            <a:r>
-              <a:rPr sz="1200">
-                <a:latin typeface="맑은 고딕"/>
-              </a:rPr>
-              <a:t>  - **설명**: 데이터 기밀성 및 무결성 보장 요구 사항 - 보안 조치 명시.</a:t>
-            </a:r>
-          </a:p>
-          <a:p>
-            <a:r>
-              <a:rPr sz="1200">
-                <a:latin typeface="맑은 고딕"/>
-              </a:rPr>
-              <a:t>    - **세부 내용**:</a:t>
-            </a:r>
-          </a:p>
-          <a:p>
-            <a:r>
-              <a:rPr sz="1200">
-                <a:latin typeface="맑은 고딕"/>
-              </a:rPr>
-              <a:t>      - 모든 중요 데이터에 대한 암호화 적용 (예: TLS/SSL).</a:t>
-            </a:r>
-          </a:p>
-          <a:p>
-            <a:r>
-              <a:rPr sz="1200">
-                <a:latin typeface="맑은 고딕"/>
-              </a:rPr>
-              <a:t>      - 접근 로그 유지 및 분석을 위한 정책 정의.</a:t>
-            </a:r>
-          </a:p>
-          <a:p>
-            <a:r>
-              <a:rPr sz="1200">
-                <a:latin typeface="맑은 고딕"/>
-              </a:rPr>
-              <a:t>  - **요구사항 번호**: SR02</a:t>
-            </a:r>
-          </a:p>
-          <a:p>
-            <a:r>
-              <a:rPr sz="1200">
-                <a:latin typeface="맑은 고딕"/>
-              </a:rPr>
-              <a:t>    - **설명**: 운영 접근 제어 요구 사항 - 사용자 인증 및 권한 관리 강화 방안 제시.</a:t>
-            </a:r>
-          </a:p>
-          <a:p>
-            <a:r>
-              <a:rPr sz="1200">
-                <a:latin typeface="맑은 고딕"/>
-              </a:rPr>
-              <a:t>      - **세부 내용**:</a:t>
-            </a:r>
-          </a:p>
-          <a:p>
-            <a:r>
-              <a:rPr sz="1200">
-                <a:latin typeface="맑은 고딕"/>
-              </a:rPr>
-              <a:t>        - 다중 인증 요소(Multi-Factor Authentication) 도입 권장.</a:t>
-            </a:r>
-          </a:p>
-          <a:p>
-            <a:r>
-              <a:rPr sz="1200">
-                <a:latin typeface="맑은 고딕"/>
-              </a:rPr>
-              <a:t>        - 정기적인 보안 교육 및 훈련 계획 포함.</a:t>
-            </a:r>
-          </a:p>
-          <a:p/>
-          <a:p>
-            <a:r>
-              <a:rPr sz="1200">
-                <a:latin typeface="맑은 고딕"/>
-              </a:rPr>
-              <a:t>#### 9. 프로젝트 관리 요구사항 (Project Management Requirements)</a:t>
-            </a:r>
-          </a:p>
-          <a:p>
-            <a:r>
-              <a:rPr sz="1200">
-                <a:latin typeface="맑은 고딕"/>
-              </a:rPr>
-              <a:t>- **요구사항 번호**: PMR01</a:t>
+              <a:t>| **항목**          | **세부 내용**                                             | **예상 개수** |</a:t>
+            </a:r>
+          </a:p>
+          <a:p>
+            <a:r>
+              <a:rPr sz="1200">
+                <a:latin typeface="맑은 고딕"/>
+              </a:rPr>
+              <a:t>|-------------------|-----------------------------------------------------------|--------------|</a:t>
+            </a:r>
+          </a:p>
+          <a:p>
+            <a:r>
+              <a:rPr sz="1200">
+                <a:latin typeface="맑은 고딕"/>
+              </a:rPr>
+              <a:t>| **하드웨어**      | 서버 용량 (대용량 클라우드 스토리지 포함)                  | 2            |</a:t>
+            </a:r>
+          </a:p>
+          <a:p>
+            <a:r>
+              <a:rPr sz="1200">
+                <a:latin typeface="맑은 고딕"/>
+              </a:rPr>
+              <a:t>|                   | 네트워크 장비 (고속 인터넷 연결 보장)                    |               |</a:t>
+            </a:r>
+          </a:p>
+          <a:p>
+            <a:r>
+              <a:rPr sz="1200">
+                <a:latin typeface="맑은 고딕"/>
+              </a:rPr>
+              <a:t>|                   | 백업 및 복구 시스템                                      |              |</a:t>
+            </a:r>
+          </a:p>
+          <a:p>
+            <a:r>
+              <a:rPr sz="1200">
+                <a:latin typeface="맑은 고딕"/>
+              </a:rPr>
+              <a:t>| **소프트웨어**    | 운영 체제                                                |              |</a:t>
+            </a:r>
+          </a:p>
+          <a:p>
+            <a:r>
+              <a:rPr sz="1200">
+                <a:latin typeface="맑은 고딕"/>
+              </a:rPr>
+              <a:t>|                   | 보험 관리 소프트웨어 라이선스                             |              |</a:t>
+            </a:r>
+          </a:p>
+          <a:p>
+            <a:r>
+              <a:rPr sz="1200">
+                <a:latin typeface="맑은 고딕"/>
+              </a:rPr>
+              <a:t>|                   | 보안 솔루션 (데이터 보호 및 암호화)                      |              |</a:t>
             </a:r>
           </a:p>
         </p:txBody>
@@ -3912,71 +3596,23 @@
               <a:rPr sz="1200">
                 <a:latin typeface="맑은 고딕"/>
               </a:rPr>
-              <a:t>- **설명**: 프로젝트 수행 방법 및 단계별 계획 명시 - 체계적인 프로젝트 관리 방안 제시.</a:t>
-            </a:r>
-          </a:p>
-          <a:p>
-            <a:r>
-              <a:rPr sz="1200">
-                <a:latin typeface="맑은 고딕"/>
-              </a:rPr>
-              <a:t>    - **세부 내용**:</a:t>
-            </a:r>
-          </a:p>
-          <a:p>
-            <a:r>
-              <a:rPr sz="1200">
-                <a:latin typeface="맑은 고딕"/>
-              </a:rPr>
-              <a:t>      - Gantt 차트 기반의 상세 프로젝트 일정 및 마일스톤 정의.</a:t>
-            </a:r>
-          </a:p>
-          <a:p>
-            <a:r>
-              <a:rPr sz="1200">
-                <a:latin typeface="맑은 고딕"/>
-              </a:rPr>
-              <a:t>      - 정기적인 진행 회의 및 보고서 제출 일정 설정.</a:t>
-            </a:r>
-          </a:p>
-          <a:p>
-            <a:r>
-              <a:rPr sz="1200">
-                <a:latin typeface="맑은 고딕"/>
-              </a:rPr>
-              <a:t>  - **요구사항 번호**: PMR02</a:t>
-            </a:r>
-          </a:p>
-          <a:p>
-            <a:r>
-              <a:rPr sz="1200">
-                <a:latin typeface="맑은 고딕"/>
-              </a:rPr>
-              <a:t>    - **설명**: 지원 사항 명시 - 원활한 프로젝트 수행을 위한 외부 자원 활용 방안 제시.</a:t>
-            </a:r>
-          </a:p>
-          <a:p>
-            <a:r>
-              <a:rPr sz="1200">
-                <a:latin typeface="맑은 고딕"/>
-              </a:rPr>
-              <a:t>      - **세부 내용**:</a:t>
-            </a:r>
-          </a:p>
-          <a:p>
-            <a:r>
-              <a:rPr sz="1200">
-                <a:latin typeface="맑은 고딕"/>
-              </a:rPr>
-              <a:t>        - 교육 프로그램 및 기술 지원 계획 포함.</a:t>
-            </a:r>
-          </a:p>
-          <a:p>
-            <a:r>
-              <a:rPr sz="1200">
-                <a:latin typeface="맑은 고딕"/>
-              </a:rPr>
-              <a:t>        - 유지보수 계약 및 후속 관리 프로세스 정의.</a:t>
+              <a:t>| **기타 장비**     | 사용자 친화적인 인터페이스 개발 도구                        |              |</a:t>
+            </a:r>
+          </a:p>
+          <a:p>
+            <a:r>
+              <a:rPr sz="1200">
+                <a:latin typeface="맑은 고딕"/>
+              </a:rPr>
+              <a:t>|                   | 데이터 분석 및 시각화 도구                                |              |</a:t>
+            </a:r>
+          </a:p>
+          <a:p>
+            <a:r>
+              <a:rPr sz="1200">
+                <a:latin typeface="맑은 고딕"/>
+              </a:rPr>
+              <a:t>| **총계**          | **---**                                                    | **1**        |</a:t>
             </a:r>
           </a:p>
           <a:p/>
@@ -3985,87 +3621,40 @@
               <a:rPr sz="1200">
                 <a:latin typeface="맑은 고딕"/>
               </a:rPr>
-              <a:t>#### 10. 제약사항 요구사항 (Constraints Requirements)</a:t>
-            </a:r>
-          </a:p>
-          <a:p>
-            <a:r>
-              <a:rPr sz="1200">
-                <a:latin typeface="맑은 고딕"/>
-              </a:rPr>
-              <a:t>- **요구사항 번호**: CCR01</a:t>
-            </a:r>
-          </a:p>
-          <a:p>
-            <a:r>
-              <a:rPr sz="1200">
-                <a:latin typeface="맑은 고딕"/>
-              </a:rPr>
-              <a:t>  - **설명**: 기술적 제약 사항 명시 - 특정 환경에서의 제약 고려 필요성 제시.</a:t>
-            </a:r>
-          </a:p>
-          <a:p>
-            <a:r>
-              <a:rPr sz="1200">
-                <a:latin typeface="맑은 고딕"/>
-              </a:rPr>
-              <a:t>    - **세부 내용**:</a:t>
-            </a:r>
-          </a:p>
-          <a:p>
-            <a:r>
-              <a:rPr sz="1200">
-                <a:latin typeface="맑은 고딕"/>
-              </a:rPr>
-              <a:t>      - 호환성 문제 해결을 위한 기존 시스템과의 통합 방안 포함.</a:t>
-            </a:r>
-          </a:p>
-          <a:p>
-            <a:r>
-              <a:rPr sz="1200">
-                <a:latin typeface="맑은 고딕"/>
-              </a:rPr>
-              <a:t>      - 특정 하드웨어 또는 소프트웨어 버전 제한사항 명시.</a:t>
-            </a:r>
-          </a:p>
-          <a:p>
-            <a:r>
-              <a:rPr sz="1200">
-                <a:latin typeface="맑은 고딕"/>
-              </a:rPr>
-              <a:t>  - **요구사항 번호**: CCR02</a:t>
-            </a:r>
-          </a:p>
-          <a:p>
-            <a:r>
-              <a:rPr sz="1200">
-                <a:latin typeface="맑은 고딕"/>
-              </a:rPr>
-              <a:t>    - **설명**: 자원 제약 사항 명시 - 인력 및 시간 관련 제한 사항 제시.</a:t>
-            </a:r>
-          </a:p>
-          <a:p>
-            <a:r>
-              <a:rPr sz="1200">
-                <a:latin typeface="맑은 고딕"/>
-              </a:rPr>
-              <a:t>      - **세부 내용**:</a:t>
-            </a:r>
-          </a:p>
-          <a:p>
-            <a:r>
-              <a:rPr sz="1200">
-                <a:latin typeface="맑은 고딕"/>
-              </a:rPr>
-              <a:t>        - 프로젝트 기간 내 완료 가능한 핵심 작업 우선순위 정의.</a:t>
-            </a:r>
-          </a:p>
-          <a:p>
-            <a:r>
-              <a:rPr sz="1200">
-                <a:latin typeface="맑은 고딕"/>
-              </a:rPr>
-              <a:t>        - 잠재적 지연 요인에 대한 대응 계획 포함.</a:t>
+              <a:t>#### 3. 성능 요구 사항</a:t>
+            </a:r>
+          </a:p>
+          <a:p>
+            <a:r>
+              <a:rPr sz="1200">
+                <a:latin typeface="맑은 고딕"/>
+              </a:rPr>
+              <a:t>**목표:** 시스템의 효율성과 안정성에 대한 구체적인 요구사항을 명시합니다.</a:t>
+            </a:r>
+          </a:p>
+          <a:p/>
+          <a:p>
+            <a:r>
+              <a:rPr sz="1200">
+                <a:latin typeface="맑은 고딕"/>
+              </a:rPr>
+              <a:t>| **항목**            | **세부 내용**                                                                                     | **예상 개수** |</a:t>
+            </a:r>
+          </a:p>
+          <a:p>
+            <a:r>
+              <a:rPr sz="1200">
+                <a:latin typeface="맑은 고딕"/>
+              </a:rPr>
+              <a:t>|---------------------|--------------------------------------------------------------------------------------------------|--------------|</a:t>
+            </a:r>
+          </a:p>
+          <a:p>
+            <a:r>
+              <a:rPr sz="1200">
+                <a:latin typeface="맑은 고딕"/>
+              </a:rPr>
+              <a:t>| **처리 속도**       | 응답 시간 최소화 (예: 로그인 및 청구 처리의 최대 응답 시간)                                  | 2            |</a:t>
             </a:r>
           </a:p>
         </p:txBody>
@@ -4131,7 +3720,65 @@
               <a:rPr sz="1200">
                 <a:latin typeface="맑은 고딕"/>
               </a:rPr>
-              <a:t>이러한 요구사항 총괄표는 바레인 건강보험 시스템 구축 사업의 체계적이고 명확한 이해와 실행을 위한 기반을 제공합니다. 각 항목별로 구체적인 세부 사항과 목표를 명확히 하여 프로젝트의 성공 가능성을 극대화하는데 중점을 두었습니다.</a:t>
+              <a:t>| **용량**            | 일일 최대 트래픽 용량 보장                                                                       |              |</a:t>
+            </a:r>
+          </a:p>
+          <a:p>
+            <a:r>
+              <a:rPr sz="1200">
+                <a:latin typeface="맑은 고딕"/>
+              </a:rPr>
+              <a:t>| **가용성**          | 시스템 가용성 ( uptime 목표 %)                                                                  |              |</a:t>
+            </a:r>
+          </a:p>
+          <a:p>
+            <a:r>
+              <a:rPr sz="1200">
+                <a:latin typeface="맑은 고딕"/>
+              </a:rPr>
+              <a:t>| **동적/정적 용량**  | 동적 부하 분산 및 정적 자원 관리 방안                                                          |              |</a:t>
+            </a:r>
+          </a:p>
+          <a:p>
+            <a:r>
+              <a:rPr sz="1200">
+                <a:latin typeface="맑은 고딕"/>
+              </a:rPr>
+              <a:t>| **확장성**          | 클라우드 기반 인프라로의 확장 가능 여부                                                         |              |</a:t>
+            </a:r>
+          </a:p>
+          <a:p>
+            <a:r>
+              <a:rPr sz="1200">
+                <a:latin typeface="맑은 고딕"/>
+              </a:rPr>
+              <a:t>| **총계**            | **---**                                                                                           | **5**        |</a:t>
+            </a:r>
+          </a:p>
+          <a:p/>
+          <a:p>
+            <a:r>
+              <a:rPr sz="1200">
+                <a:latin typeface="맑은 고딕"/>
+              </a:rPr>
+              <a:t>#### 4. 인터페이스 요구 사항</a:t>
+            </a:r>
+          </a:p>
+          <a:p>
+            <a:r>
+              <a:rPr sz="1200">
+                <a:latin typeface="맑은 고딕"/>
+              </a:rPr>
+              <a:t>**목표:** 시스템 내부 및 외부와의 상호작용을 위한 사용자 경험과 안정성 요구사항 정의합니다.</a:t>
+            </a:r>
+          </a:p>
+          <a:p/>
+          <a:p>
+            <a:r>
+              <a:rPr sz="1200">
+                <a:latin typeface="맑은 고딕"/>
+              </a:rPr>
+              <a:t>| **항목**          | **세부 내용**                                                   | **예상 개수** |</a:t>
             </a:r>
           </a:p>
         </p:txBody>
@@ -4173,7 +3820,7 @@
               <a:rPr sz="1800">
                 <a:latin typeface="맑은 고딕"/>
               </a:rPr>
-              <a:t>제안요청사항 - 요구사항 목록</a:t>
+              <a:t>제안요청사항 - 요구사항 총괄 (계속)</a:t>
             </a:r>
           </a:p>
         </p:txBody>
@@ -4197,7 +3844,47 @@
               <a:rPr sz="1200">
                 <a:latin typeface="맑은 고딕"/>
               </a:rPr>
-              <a:t>### 요구사항 목록표 (Markdown Format)</a:t>
+              <a:t>|-------------------|-----------------------------------------------------------------|--------------|</a:t>
+            </a:r>
+          </a:p>
+          <a:p>
+            <a:r>
+              <a:rPr sz="1200">
+                <a:latin typeface="맑은 고딕"/>
+              </a:rPr>
+              <a:t>| **사용자 인터페이스** | 직관적이고 사용하기 쉬운 UI/UX 디자인                                              | 5            |</a:t>
+            </a:r>
+          </a:p>
+          <a:p>
+            <a:r>
+              <a:rPr sz="1200">
+                <a:latin typeface="맑은 고딕"/>
+              </a:rPr>
+              <a:t>|                   | 모바일 최적화                                                 |              |</a:t>
+            </a:r>
+          </a:p>
+          <a:p>
+            <a:r>
+              <a:rPr sz="1200">
+                <a:latin typeface="맑은 고딕"/>
+              </a:rPr>
+              <a:t>| **시스템 인터페이스** | API 통합 용이성 및 안정성 확보                                                    |              |</a:t>
+            </a:r>
+          </a:p>
+          <a:p>
+            <a:r>
+              <a:rPr sz="1200">
+                <a:latin typeface="맑은 고딕"/>
+              </a:rPr>
+              <a:t>| **파트너 시스템 연결** | 외부 시스템과의 원활한 연동 (데이터 교환 프로토콜 포함)                         |              |</a:t>
+            </a:r>
+          </a:p>
+          <a:p>
+            <a:r>
+              <a:rPr sz="1200">
+                <a:latin typeface="맑은 고딕"/>
+              </a:rPr>
+              <a:t>| **총계**          | **---**                                                          | **6**        |</a:t>
             </a:r>
           </a:p>
           <a:p/>
@@ -4206,47 +3893,24 @@
               <a:rPr sz="1200">
                 <a:latin typeface="맑은 고딕"/>
               </a:rPr>
-              <a:t>#### 기능 요구사항 목록</a:t>
-            </a:r>
-          </a:p>
-          <a:p>
-            <a:r>
-              <a:rPr sz="1200">
-                <a:latin typeface="맑은 고딕"/>
-              </a:rPr>
-              <a:t>| 코드 | 요구사항 명                 | 설명                                                                                                                      | 개수 |</a:t>
-            </a:r>
-          </a:p>
-          <a:p>
-            <a:r>
-              <a:rPr sz="1200">
-                <a:latin typeface="맑은 고딕"/>
-              </a:rPr>
-              <a:t>|------|---------------------------|-----------------------------------------------------------------------------------------------------------------------|-----|</a:t>
-            </a:r>
-          </a:p>
-          <a:p>
-            <a:r>
-              <a:rPr sz="1200">
-                <a:latin typeface="맑은 고딕"/>
-              </a:rPr>
-              <a:t>| **001** | 업무 프로세스 설계         | 시스템 내에서의 업무 흐름과 절차를 명확하게 정의하고 구현해야 함.                                                       |     |</a:t>
-            </a:r>
-          </a:p>
-          <a:p>
-            <a:r>
-              <a:rPr sz="1200">
-                <a:latin typeface="맑은 고딕"/>
-              </a:rPr>
-              <a:t>| **002** | 공통(일반)               | 일반적인 사용자 인터페이스 및 기능들이 올바르게 제공되어야 함 (예: 회원가입, 게시판 관리 등).                             |     |</a:t>
-            </a:r>
-          </a:p>
-          <a:p>
-            <a:r>
-              <a:rPr sz="1200">
-                <a:latin typeface="맑은 고딕"/>
-              </a:rPr>
-              <a:t>| **003** | 회원 및 게시판 관리       | 안전하고 효율적인 회원 관리 시스템과 게시판 운영 기능 구현.                                                             |     |</a:t>
+              <a:t>#### 5. 데이터 요구 사항</a:t>
+            </a:r>
+          </a:p>
+          <a:p>
+            <a:r>
+              <a:rPr sz="1200">
+                <a:latin typeface="맑은 고딕"/>
+              </a:rPr>
+              <a:t>**목표:** 데이터 관리 및 보안에 대한 세부 요구사항을 명시합니다.</a:t>
+            </a:r>
+          </a:p>
+          <a:p/>
+          <a:p>
+            <a:r>
+              <a:rPr sz="1200">
+                <a:latin typeface="맑은 고딕"/>
+              </a:rPr>
+              <a:t>| **항목**            | **세부 내용**                                                                         | **예상 개수** |</a:t>
             </a:r>
           </a:p>
         </p:txBody>
@@ -4288,7 +3952,7 @@
               <a:rPr sz="1800">
                 <a:latin typeface="맑은 고딕"/>
               </a:rPr>
-              <a:t>제안요청사항 - 요구사항 목록 (계속)</a:t>
+              <a:t>제안요청사항 - 요구사항 총괄 (계속)</a:t>
             </a:r>
           </a:p>
         </p:txBody>
@@ -4312,39 +3976,65 @@
               <a:rPr sz="1200">
                 <a:latin typeface="맑은 고딕"/>
               </a:rPr>
-              <a:t>| **004** | 권한 관리                 | 사용자별 접근 권한을 세분화하여 관리할 수 있는 시스템 구축 필요.                                                        |     |</a:t>
-            </a:r>
-          </a:p>
-          <a:p>
-            <a:r>
-              <a:rPr sz="1200">
-                <a:latin typeface="맑은 고딕"/>
-              </a:rPr>
-              <a:t>| **005** | 이메일 및 SMS 알림         | 이메일과 SMS를 통한 실시간 알림 시스템 구축 및 통합 지원.                                                             |     |</a:t>
-            </a:r>
-          </a:p>
-          <a:p>
-            <a:r>
-              <a:rPr sz="1200">
-                <a:latin typeface="맑은 고딕"/>
-              </a:rPr>
-              <a:t>| **006** | SW 국제화                | 다국어 환경에서의 소프트웨어 호환성 확보 (지역별 언어 지원).                                                         |     |</a:t>
-            </a:r>
-          </a:p>
-          <a:p>
-            <a:r>
-              <a:rPr sz="1200">
-                <a:latin typeface="맑은 고딕"/>
-              </a:rPr>
-              <a:t>| **007** | 의약품 수입 내역 보고      | 정기적으로 의약품 수입 현황을 자동으로 기록하고 보고서 생성 기능 필요.                                                 |     |</a:t>
-            </a:r>
-          </a:p>
-          <a:p>
-            <a:r>
-              <a:rPr sz="1200">
-                <a:latin typeface="맑은 고딕"/>
-              </a:rPr>
-              <a:t>| **008** | 의약품 공급 내역 보고      | 의약품의 공급 과정 및 도착 정보를 상세히 기록하고 관리하는 시스템 구축.                                              |     |</a:t>
+              <a:t>|---------------------|---------------------------------------------------------------------------------------|--------------|</a:t>
+            </a:r>
+          </a:p>
+          <a:p>
+            <a:r>
+              <a:rPr sz="1200">
+                <a:latin typeface="맑은 고딕"/>
+              </a:rPr>
+              <a:t>| **데이터 구축**      | 초기 데이터 수집 방법 및 이관 전략                                                    |              |</a:t>
+            </a:r>
+          </a:p>
+          <a:p>
+            <a:r>
+              <a:rPr sz="1200">
+                <a:latin typeface="맑은 고딕"/>
+              </a:rPr>
+              <a:t>| **보안 요구사항**   | 민감한 개인 정보 암호화, 접근 제어 정책                                              |              |</a:t>
+            </a:r>
+          </a:p>
+          <a:p>
+            <a:r>
+              <a:rPr sz="1200">
+                <a:latin typeface="맑은 고딕"/>
+              </a:rPr>
+              <a:t>| **데이터 변환**     | 기존 시스템과의 데이터 통합 방안                                                      |              |</a:t>
+            </a:r>
+          </a:p>
+          <a:p>
+            <a:r>
+              <a:rPr sz="1200">
+                <a:latin typeface="맑은 고딕"/>
+              </a:rPr>
+              <a:t>| **총계**            | **---**                                                                               | **7**        |</a:t>
+            </a:r>
+          </a:p>
+          <a:p/>
+          <a:p>
+            <a:r>
+              <a:rPr sz="1200">
+                <a:latin typeface="맑은 고딕"/>
+              </a:rPr>
+              <a:t>#### 6. 테스트 요구 사항</a:t>
+            </a:r>
+          </a:p>
+          <a:p>
+            <a:r>
+              <a:rPr sz="1200">
+                <a:latin typeface="맑은 고딕"/>
+              </a:rPr>
+              <a:t>**목표:** 시스템 구축 후 및 운영 중에 수행해야 하는 테스트 요구사항을 명시합니다.</a:t>
+            </a:r>
+          </a:p>
+          <a:p/>
+          <a:p>
+            <a:r>
+              <a:rPr sz="1200">
+                <a:latin typeface="맑은 고딕"/>
+              </a:rPr>
+              <a:t>| **항목**          | **세부 내용**                                                      | **예상 개수** |</a:t>
             </a:r>
           </a:p>
         </p:txBody>
@@ -4386,7 +4076,7 @@
               <a:rPr sz="1800">
                 <a:latin typeface="맑은 고딕"/>
               </a:rPr>
-              <a:t>제안요청사항 - 요구사항 목록 (계속)</a:t>
+              <a:t>제안요청사항 - 요구사항 총괄 (계속)</a:t>
             </a:r>
           </a:p>
         </p:txBody>
@@ -4410,47 +4100,73 @@
               <a:rPr sz="1200">
                 <a:latin typeface="맑은 고딕"/>
               </a:rPr>
-              <a:t>| **009** | 의약품 입고 내역 보고      | 의약품 입고 시 상세한 기록 및 추적 기능 구현 필요.                                                                      |     |</a:t>
-            </a:r>
-          </a:p>
-          <a:p>
-            <a:r>
-              <a:rPr sz="1200">
-                <a:latin typeface="맑은 고딕"/>
-              </a:rPr>
-              <a:t>| **010** | 의약품 사용 내역 보고      | 처방 및 사용된 의약품의 상세 내역을 자동으로 업데이트하고 관리하는 시스템 구축.                                          |     |</a:t>
-            </a:r>
-          </a:p>
-          <a:p>
-            <a:r>
-              <a:rPr sz="1200">
-                <a:latin typeface="맑은 고딕"/>
-              </a:rPr>
-              <a:t>| **011** | 회수대상 의약품 회수보고  | 회수된 의약품에 대한 체계적인 보고 및 추적 시스템 필요.                                                               |     |</a:t>
-            </a:r>
-          </a:p>
-          <a:p>
-            <a:r>
-              <a:rPr sz="1200">
-                <a:latin typeface="맑은 고딕"/>
-              </a:rPr>
-              <a:t>| **012** | 보고내역 정정             | 기존 보고서의 수정 및 재작성 기능 구현 가능해야 함 (오류 수정 포함).                                                   |     |</a:t>
-            </a:r>
-          </a:p>
-          <a:p>
-            <a:r>
-              <a:rPr sz="1200">
-                <a:latin typeface="맑은 고딕"/>
-              </a:rPr>
-              <a:t>| **013** | 보고내역 취소              | 특정 시점 이후로 생성된 모든 보고서를 삭제하거나 취소할 수 있는 기능 필요.                                           |     |</a:t>
-            </a:r>
-          </a:p>
-          <a:p>
-            <a:r>
-              <a:rPr sz="1200">
-                <a:latin typeface="맑은 고딕"/>
-              </a:rPr>
-              <a:t>| **014** | 의약품 주문                | 온라인 또는 오프라인을 통해 의약품을 효율적으로 주문하고 관리하는 시스템 구축.                                         |     |</a:t>
+              <a:t>|-------------------|--------------------------------------------------------------------|--------------|</a:t>
+            </a:r>
+          </a:p>
+          <a:p>
+            <a:r>
+              <a:rPr sz="1200">
+                <a:latin typeface="맑은 고딕"/>
+              </a:rPr>
+              <a:t>| **BMT (성능 테스트)** | 시스템 성능 검증을 위한 벤치마크 테스트 계획                            | 2            |</a:t>
+            </a:r>
+          </a:p>
+          <a:p>
+            <a:r>
+              <a:rPr sz="1200">
+                <a:latin typeface="맑은 고딕"/>
+              </a:rPr>
+              <a:t>| **운영 테스트**    | 실제 운영 환경에서의 안정성 및 기능 검증                             |              |</a:t>
+            </a:r>
+          </a:p>
+          <a:p>
+            <a:r>
+              <a:rPr sz="1200">
+                <a:latin typeface="맑은 고딕"/>
+              </a:rPr>
+              <a:t>| **사용자 테스트**  | 최종 사용자 피드백 수집을 위한 프로토타입 테스트                        |              |</a:t>
+            </a:r>
+          </a:p>
+          <a:p>
+            <a:r>
+              <a:rPr sz="1200">
+                <a:latin typeface="맑은 고딕"/>
+              </a:rPr>
+              <a:t>| **총계**          | **---**                                                             | **2**        |</a:t>
+            </a:r>
+          </a:p>
+          <a:p/>
+          <a:p>
+            <a:r>
+              <a:rPr sz="1200">
+                <a:latin typeface="맑은 고딕"/>
+              </a:rPr>
+              <a:t>#### 7. 품질 요구 사항</a:t>
+            </a:r>
+          </a:p>
+          <a:p>
+            <a:r>
+              <a:rPr sz="1200">
+                <a:latin typeface="맑은 고딕"/>
+              </a:rPr>
+              <a:t>**목표:** 시스템의 안정성과 신뢰성을 보장하기 위한 품질 관리 요구사항 정의합니다.</a:t>
+            </a:r>
+          </a:p>
+          <a:p/>
+          <a:p>
+            <a:r>
+              <a:rPr sz="1200">
+                <a:latin typeface="맑은 고딕"/>
+              </a:rPr>
+              <a:t>| **항목**         | **세부 내용**                                                    | **예상 개수** |</a:t>
+            </a:r>
+          </a:p>
+          <a:p>
+            <a:r>
+              <a:rPr sz="1200">
+                <a:latin typeface="맑은 고딕"/>
+              </a:rPr>
+              <a:t>|------------------|------------------------------------------------------------------|--------------|</a:t>
             </a:r>
           </a:p>
         </p:txBody>
@@ -4492,7 +4208,7 @@
               <a:rPr sz="1800">
                 <a:latin typeface="맑은 고딕"/>
               </a:rPr>
-              <a:t>제안요청사항 - 요구사항 목록 (계속)</a:t>
+              <a:t>제안요청사항 - 요구사항 총괄 (계속)</a:t>
             </a:r>
           </a:p>
         </p:txBody>
@@ -4516,47 +4232,81 @@
               <a:rPr sz="1200">
                 <a:latin typeface="맑은 고딕"/>
               </a:rPr>
-              <a:t>| **015** | 재고관리                  | 실시간 재고 추적 및 예측 분석 기능을 포함한 의약품 재고 관리 시스템 구현 필요.                                        |     |</a:t>
-            </a:r>
-          </a:p>
-          <a:p>
-            <a:r>
-              <a:rPr sz="1200">
-                <a:latin typeface="맑은 고딕"/>
-              </a:rPr>
-              <a:t>| **016** | 마약류 의약품 관리        | 마약류 의약품의 특별한 보안 및 관리 체계 구축 필요.                                                                    |     |</a:t>
-            </a:r>
-          </a:p>
-          <a:p>
-            <a:r>
-              <a:rPr sz="1200">
-                <a:latin typeface="맑은 고딕"/>
-              </a:rPr>
-              <a:t>| **017** | 의약품 유통정보 현황조회  | 실시간으로 의약품의 유통 상황을 확인할 수 있는 인터페이스 제공.                                                     |     |</a:t>
-            </a:r>
-          </a:p>
-          <a:p>
-            <a:r>
-              <a:rPr sz="1200">
-                <a:latin typeface="맑은 고딕"/>
-              </a:rPr>
-              <a:t>| **018** | 의약품 정보검색            | 사용자가 쉽게 의약품 정보를 검색하고 접근할 수 있도록 시스템 구축 필요.                                              |     |</a:t>
-            </a:r>
-          </a:p>
-          <a:p>
-            <a:r>
-              <a:rPr sz="1200">
-                <a:latin typeface="맑은 고딕"/>
-              </a:rPr>
-              <a:t>| **019** | 의약품 안전점검             | 주기적인 안전 점검을 자동화하고 결과를 기록하는 시스템 필요.                                                          |     |</a:t>
-            </a:r>
-          </a:p>
-          <a:p>
-            <a:r>
-              <a:rPr sz="1200">
-                <a:latin typeface="맑은 고딕"/>
-              </a:rPr>
-              <a:t>| **020** | 약국 의약품 재고정보 조회   | 약국별로 실시간 재고 정보 확인 가능한 기능 구현 필요.                                                                  |     |</a:t>
+              <a:t>| **품질 표준**   | ISO 인증 기준 준수 및 관련 법규 준수                             |              |</a:t>
+            </a:r>
+          </a:p>
+          <a:p>
+            <a:r>
+              <a:rPr sz="1200">
+                <a:latin typeface="맑은 고딕"/>
+              </a:rPr>
+              <a:t>| **유지보수**     | 정기적인 업데이트와 버그 수정 계획                               |              |</a:t>
+            </a:r>
+          </a:p>
+          <a:p>
+            <a:r>
+              <a:rPr sz="1200">
+                <a:latin typeface="맑은 고딕"/>
+              </a:rPr>
+              <a:t>| **성능 보증**    | 시스템 성능 지표에 대한 명확한 목표 설정                       |              |</a:t>
+            </a:r>
+          </a:p>
+          <a:p>
+            <a:r>
+              <a:rPr sz="1200">
+                <a:latin typeface="맑은 고딕"/>
+              </a:rPr>
+              <a:t>| **총계**         | **---**                                                           | **5**        |</a:t>
+            </a:r>
+          </a:p>
+          <a:p/>
+          <a:p>
+            <a:r>
+              <a:rPr sz="1200">
+                <a:latin typeface="맑은 고딕"/>
+              </a:rPr>
+              <a:t>#### 8. 보안 요구 사항</a:t>
+            </a:r>
+          </a:p>
+          <a:p>
+            <a:r>
+              <a:rPr sz="1200">
+                <a:latin typeface="맑은 고딕"/>
+              </a:rPr>
+              <a:t>**목표:** 정보 자산의 보호를 위한 보안 체계 구축 요구사항 정의합니다.</a:t>
+            </a:r>
+          </a:p>
+          <a:p/>
+          <a:p>
+            <a:r>
+              <a:rPr sz="1200">
+                <a:latin typeface="맑은 고딕"/>
+              </a:rPr>
+              <a:t>| **항목**          | **세부 내용**                                                         | **예상 개수** |</a:t>
+            </a:r>
+          </a:p>
+          <a:p>
+            <a:r>
+              <a:rPr sz="1200">
+                <a:latin typeface="맑은 고딕"/>
+              </a:rPr>
+              <a:t>|-------------------|-----------------------------------------------------------------------|--------------|</a:t>
+            </a:r>
+          </a:p>
+          <a:p>
+            <a:r>
+              <a:rPr sz="1200">
+                <a:latin typeface="맑은 고딕"/>
+              </a:rPr>
+              <a:t>| **데이터 보안**   | 데이터 암호화 및 접근 제어 정책                                      |              |</a:t>
+            </a:r>
+          </a:p>
+          <a:p>
+            <a:r>
+              <a:rPr sz="1200">
+                <a:latin typeface="맑은 고딕"/>
+              </a:rPr>
+              <a:t>| **기능 보안**     | 시스템 내 특정 기능에 대한 접근 제한 및 인증 메커니즘                 |              |</a:t>
             </a:r>
           </a:p>
         </p:txBody>
@@ -4598,7 +4348,7 @@
               <a:rPr sz="1800">
                 <a:latin typeface="맑은 고딕"/>
               </a:rPr>
-              <a:t>제안요청사항 - 요구사항 목록 (계속)</a:t>
+              <a:t>제안요청사항 - 요구사항 총괄 (계속)</a:t>
             </a:r>
           </a:p>
         </p:txBody>
@@ -4622,47 +4372,73 @@
               <a:rPr sz="1200">
                 <a:latin typeface="맑은 고딕"/>
               </a:rPr>
-              <a:t>| **021** | 개인별 투약이력 조회      | 환자의 개별적인 약물 복용 이력을 상세하게 관리할 수 있는 시스템 구축 필요.                                            |     |</a:t>
-            </a:r>
-          </a:p>
-          <a:p>
-            <a:r>
-              <a:rPr sz="1200">
-                <a:latin typeface="맑은 고딕"/>
-              </a:rPr>
-              <a:t>| **022** | 의약품 안전점검 현황조회   | 수행된 모든 안전 점검 결과를 한눈에 볼 수 있는 대시보드 제공.                                                        |     |</a:t>
-            </a:r>
-          </a:p>
-          <a:p>
-            <a:r>
-              <a:rPr sz="1200">
-                <a:latin typeface="맑은 고딕"/>
-              </a:rPr>
-              <a:t>| **023** | 의약품 안전점검 기준관리   | 안전 관리 기준을 설정하고 준수 여부 확인할 수 있는 시스템 구축 필요.                                                  |     |</a:t>
-            </a:r>
-          </a:p>
-          <a:p>
-            <a:r>
-              <a:rPr sz="1200">
-                <a:latin typeface="맑은 고딕"/>
-              </a:rPr>
-              <a:t>| **024** | 의약품 처방 및 조제        | 의료진이 정확한 처방과 조제를 수행하기 위한 지원 시스템 구현 필요.                                                   |     |</a:t>
-            </a:r>
-          </a:p>
-          <a:p>
-            <a:r>
-              <a:rPr sz="1200">
-                <a:latin typeface="맑은 고딕"/>
-              </a:rPr>
-              <a:t>| **025** | 약국 일반의약품 판매관리    | 일반 의약품의 판매 데이터를 추적하고 관리하는 기능 필요.                                                               |     |</a:t>
-            </a:r>
-          </a:p>
-          <a:p>
-            <a:r>
-              <a:rPr sz="1200">
-                <a:latin typeface="맑은 고딕"/>
-              </a:rPr>
-              <a:t>| **026** | 약국 현황조회              | 약국별 운영 상태 및 재고 상황을 실시간으로 확인 가능한 시스템 구축 필요.                                              |     |</a:t>
+              <a:t>| **보안 위협 대응** | 사이버 공격 대비 대응 전략                                         |              |</a:t>
+            </a:r>
+          </a:p>
+          <a:p>
+            <a:r>
+              <a:rPr sz="1200">
+                <a:latin typeface="맑은 고딕"/>
+              </a:rPr>
+              <a:t>| **총계**          | **---**                                                               | **5**        |</a:t>
+            </a:r>
+          </a:p>
+          <a:p/>
+          <a:p>
+            <a:r>
+              <a:rPr sz="1200">
+                <a:latin typeface="맑은 고딕"/>
+              </a:rPr>
+              <a:t>#### 9. 프로젝트 관리 요구 사항</a:t>
+            </a:r>
+          </a:p>
+          <a:p>
+            <a:r>
+              <a:rPr sz="1200">
+                <a:latin typeface="맑은 고딕"/>
+              </a:rPr>
+              <a:t>**목표:** 프로젝트 성공적 수행을 위한 관리 체계 요구사항 정의합니다.</a:t>
+            </a:r>
+          </a:p>
+          <a:p/>
+          <a:p>
+            <a:r>
+              <a:rPr sz="1200">
+                <a:latin typeface="맑은 고딕"/>
+              </a:rPr>
+              <a:t>| **항목**         | **세부 내용**                                                      | **예상 개수** |</a:t>
+            </a:r>
+          </a:p>
+          <a:p>
+            <a:r>
+              <a:rPr sz="1200">
+                <a:latin typeface="맑은 고딕"/>
+              </a:rPr>
+              <a:t>|------------------|--------------------------------------------------------------------|--------------|</a:t>
+            </a:r>
+          </a:p>
+          <a:p>
+            <a:r>
+              <a:rPr sz="1200">
+                <a:latin typeface="맑은 고딕"/>
+              </a:rPr>
+              <a:t>| **일정 계획**   | 마일스톤 설정 및 진행 상황 모니터링 방안                             |              |</a:t>
+            </a:r>
+          </a:p>
+          <a:p>
+            <a:r>
+              <a:rPr sz="1200">
+                <a:latin typeface="맑은 고딕"/>
+              </a:rPr>
+              <a:t>| **자원 할당**    | 인력 배치 및 역할 분담                                              |              |</a:t>
+            </a:r>
+          </a:p>
+          <a:p>
+            <a:r>
+              <a:rPr sz="1200">
+                <a:latin typeface="맑은 고딕"/>
+              </a:rPr>
+              <a:t>| **협업 프로세스** | 정기 회의 일정 및 커뮤니케이션 채널                              |              |</a:t>
             </a:r>
           </a:p>
         </p:txBody>
@@ -4728,7 +4504,7 @@
               <a:rPr sz="1200">
                 <a:latin typeface="맑은 고딕"/>
               </a:rPr>
-              <a:t>## 바레인 건강보험시스템 구축 사업 추진 배경</a:t>
+              <a:t>### 바레인 건강보험시스템 구축 사업 추진배경 답변</a:t>
             </a:r>
           </a:p>
           <a:p/>
@@ -4737,7 +4513,7 @@
               <a:rPr sz="1200">
                 <a:latin typeface="맑은 고딕"/>
               </a:rPr>
-              <a:t>**1. 건강 증진 및 보건 의료 서비스 향상의 필요성**</a:t>
+              <a:t>#### 표 형식으로 요약된 답변</a:t>
             </a:r>
           </a:p>
           <a:p/>
@@ -4746,50 +4522,31 @@
               <a:rPr sz="1200">
                 <a:latin typeface="맑은 고딕"/>
               </a:rPr>
-              <a:t>* **사회적 문제 해결:** 바레인은 고령화 사회로 진입하면서 만성 질환 증가 및 의료비 부담 증대 등의 심각한 사회적 문제에 직면하고 있습니다. 효과적인 건강 관리 시스템 구축을 통해 국민 건강 수준 개선과 의료비 효율성 제고가 시급합니다.</a:t>
-            </a:r>
-          </a:p>
-          <a:p>
-            <a:r>
-              <a:rPr sz="1200">
-                <a:latin typeface="맑은 고딕"/>
-              </a:rPr>
-              <a:t>* **국제 경쟁력 강화:** 글로벌 경제 강국으로서의 위상 유지와 국제사회에서의 신뢰도 향상을 위해 선진적인 보건 의료 시스템 구축이 필수적입니다. 건강보험 도입은 국제 표준에 부합하는 시스템 구축을 통한 경쟁력 강화에 기여합니다.</a:t>
-            </a:r>
-          </a:p>
-          <a:p/>
-          <a:p>
-            <a:r>
-              <a:rPr sz="1200">
-                <a:latin typeface="맑은 고딕"/>
-              </a:rPr>
-              <a:t>**2. 효율적인 국가 보건 의료 제도 운영 목표 달성**</a:t>
-            </a:r>
-          </a:p>
-          <a:p/>
-          <a:p>
-            <a:r>
-              <a:rPr sz="1200">
-                <a:latin typeface="맑은 고딕"/>
-              </a:rPr>
-              <a:t>* **자원 최적화:**  기존 의료 자원의 불균형 분포와 중복 투자 문제를 해결하고, 예방 중심의 보건 정책 실현을 위한 체계적인 관리 시스템 구축이 필요합니다. 건강보험 제도 도입은 이러한 자원 효율성을 극대화하는 데 핵심적 역할을 합니다.</a:t>
-            </a:r>
-          </a:p>
-          <a:p>
-            <a:r>
-              <a:rPr sz="1200">
-                <a:latin typeface="맑은 고딕"/>
-              </a:rPr>
-              <a:t>* **공정하고 접근성 높은 의료 서비스 제공:** 모든 국민에게 공평하고 안정적인 의료 접근성을 보장하기 위해 보편적 보험 제도 도입이 필수적입니다. SEHATI 프로그램은 저소득층까지 포괄하는 사회 안전망 구축에 기여합니다.</a:t>
-            </a:r>
-          </a:p>
-          <a:p/>
-          <a:p>
-            <a:r>
-              <a:rPr sz="1200">
-                <a:latin typeface="맑은 고딕"/>
-              </a:rPr>
-              <a:t>**3. 혁신 기술 도입을 통한 시스템 발전**</a:t>
+              <a:t>| **항목**                  | **내용**                                                                                           |</a:t>
+            </a:r>
+          </a:p>
+          <a:p>
+            <a:r>
+              <a:rPr sz="1200">
+                <a:latin typeface="맑은 고딕"/>
+              </a:rPr>
+              <a:t>|---------------------------|----------------------------------------------------------------------------------------------------|</a:t>
+            </a:r>
+          </a:p>
+          <a:p>
+            <a:r>
+              <a:rPr sz="1200">
+                <a:latin typeface="맑은 고딕"/>
+              </a:rPr>
+              <a:t>| **사회적 문제 해결 필요성** | - **고령화 사회 진입**: 바레인이 고령화 사회로 접어들면서 만성 질환 증가와 의료비 부담이 심각해짐.&lt;br&gt;- **의료 서비스 향상 요구**: 효과적인 건강 관리 시스템 구축으로 국민 건강 수준 개선 및 의료비 효율성 제고가 절실함.                      |</a:t>
+            </a:r>
+          </a:p>
+          <a:p>
+            <a:r>
+              <a:rPr sz="1200">
+                <a:latin typeface="맑은 고딕"/>
+              </a:rPr>
+              <a:t>| **국제 경쟁력 강화 필요성** | - **글로벌 경제 강국 위상 유지**: 선진국과 견줄 수 있는 보건 의료 시스템 구축이 국제 사회에서의 신뢰성을 높이고 경쟁력을 강화하는데 필수적임.&lt;br&gt;- **국제 표준 준수**: 건강보험 도입은 국제보건 표준에 부합하는 시스템으로 국가 이미지 제고와 협력 증진에 기여함. |</a:t>
             </a:r>
           </a:p>
         </p:txBody>
@@ -4831,7 +4588,7 @@
               <a:rPr sz="1800">
                 <a:latin typeface="맑은 고딕"/>
               </a:rPr>
-              <a:t>제안요청사항 - 요구사항 목록 (계속)</a:t>
+              <a:t>제안요청사항 - 요구사항 총괄 (계속)</a:t>
             </a:r>
           </a:p>
         </p:txBody>
@@ -4855,47 +4612,90 @@
               <a:rPr sz="1200">
                 <a:latin typeface="맑은 고딕"/>
               </a:rPr>
-              <a:t>| **027** | 의약품 유통정보 통계      | 의약품 유통에 대한 통계 데이터를 제공하는 기능 구현 필요 (예: 판매량, 이동 경로 등).                                  |     |</a:t>
-            </a:r>
-          </a:p>
-          <a:p>
-            <a:r>
-              <a:rPr sz="1200">
-                <a:latin typeface="맑은 고딕"/>
-              </a:rPr>
-              <a:t>| **028** | 의약품 안전점검 모니터링 통계 | 실시간 모니터링 시스템을 통해 안전 점검의 효과성을 분석하고 보고할 수 있어야 함.                                      |     |</a:t>
-            </a:r>
-          </a:p>
-          <a:p>
-            <a:r>
-              <a:rPr sz="1200">
-                <a:latin typeface="맑은 고딕"/>
-              </a:rPr>
-              <a:t>| **029** | 약국 의약품 통계           | 약국별 의약품 관련 주요 통계를 제공하는 기능 필요 (예: 판매량, 재고 등).                                             |     |</a:t>
-            </a:r>
-          </a:p>
-          <a:p>
-            <a:r>
-              <a:rPr sz="1200">
-                <a:latin typeface="맑은 고딕"/>
-              </a:rPr>
-              <a:t>| **030** | 약국 정보시스템 통합      | 다양한 시스템 간의 데이터 연동 및 통합 관리가 가능해야 함.                                                            |     |</a:t>
-            </a:r>
-          </a:p>
-          <a:p>
-            <a:r>
-              <a:rPr sz="1200">
-                <a:latin typeface="맑은 고딕"/>
-              </a:rPr>
-              <a:t>| **031** | 청구기준 개발             | 의약품 청구 프로세스에 대한 상세 기준을 정의하고 자동화하는 시스템 구축 필요.                                          |     |</a:t>
-            </a:r>
-          </a:p>
-          <a:p>
-            <a:r>
-              <a:rPr sz="1200">
-                <a:latin typeface="맑은 고딕"/>
-              </a:rPr>
-              <a:t>| **032** | 포털 사용자 편의사항       | 사용자 친화적인 포털 인터페이스 및 기능 제공 (예: 검색 기능, 간편 로그인 등).                                         |     |</a:t>
+              <a:t>| **총계**         | **---**                                                             | **12**       |</a:t>
+            </a:r>
+          </a:p>
+          <a:p/>
+          <a:p>
+            <a:r>
+              <a:rPr sz="1200">
+                <a:latin typeface="맑은 고딕"/>
+              </a:rPr>
+              <a:t>#### 10. 프로젝트 지원 요구 사항</a:t>
+            </a:r>
+          </a:p>
+          <a:p>
+            <a:r>
+              <a:rPr sz="1200">
+                <a:latin typeface="맑은 고딕"/>
+              </a:rPr>
+              <a:t>**목표:** 시스템 구축 및 운영을 위한 추가적인 지원 요구사항 정의합니다.</a:t>
+            </a:r>
+          </a:p>
+          <a:p/>
+          <a:p>
+            <a:r>
+              <a:rPr sz="1200">
+                <a:latin typeface="맑은 고딕"/>
+              </a:rPr>
+              <a:t>| **항목**          | **세부 내용**                                                  | **예상 개수** |</a:t>
+            </a:r>
+          </a:p>
+          <a:p>
+            <a:r>
+              <a:rPr sz="1200">
+                <a:latin typeface="맑은 고딕"/>
+              </a:rPr>
+              <a:t>|-------------------|---------------------------------------------------------------|--------------|</a:t>
+            </a:r>
+          </a:p>
+          <a:p>
+            <a:r>
+              <a:rPr sz="1200">
+                <a:latin typeface="맑은 고딕"/>
+              </a:rPr>
+              <a:t>| **시스템 안정화**| 정기적인 성능 모니터링 및 유지보수 계획                       |              |</a:t>
+            </a:r>
+          </a:p>
+          <a:p>
+            <a:r>
+              <a:rPr sz="1200">
+                <a:latin typeface="맑은 고딕"/>
+              </a:rPr>
+              <a:t>| **교육 훈련**    | 사용자 교육 프로그램 및 기술 지원 팀 구성                      |              |</a:t>
+            </a:r>
+          </a:p>
+          <a:p>
+            <a:r>
+              <a:rPr sz="1200">
+                <a:latin typeface="맑은 고딕"/>
+              </a:rPr>
+              <a:t>| **유지보수**      | 장기적인 시스템 업데이트 및 보안 패치 관리                     |              |</a:t>
+            </a:r>
+          </a:p>
+          <a:p>
+            <a:r>
+              <a:rPr sz="1200">
+                <a:latin typeface="맑은 고딕"/>
+              </a:rPr>
+              <a:t>| **총계**          | **---**                                                         | **5**        |</a:t>
+            </a:r>
+          </a:p>
+          <a:p/>
+          <a:p>
+            <a:r>
+              <a:rPr sz="1200">
+                <a:latin typeface="맑은 고딕"/>
+              </a:rPr>
+              <a:t>#### 11. 제약사항 요구 사항</a:t>
+            </a:r>
+          </a:p>
+          <a:p>
+            <a:r>
+              <a:rPr sz="1200">
+                <a:latin typeface="맑은 고딕"/>
+              </a:rPr>
+              <a:t>**목표:** 설계 및 구현 과정에서 고려해야 할 제약 조건 명시합니다.</a:t>
             </a:r>
           </a:p>
         </p:txBody>
@@ -4937,7 +4737,7 @@
               <a:rPr sz="1800">
                 <a:latin typeface="맑은 고딕"/>
               </a:rPr>
-              <a:t>제안요청사항 - 요구사항 목록 (계속)</a:t>
+              <a:t>제안요청사항 - 요구사항 총괄 (계속)</a:t>
             </a:r>
           </a:p>
         </p:txBody>
@@ -4961,39 +4761,81 @@
               <a:rPr sz="1200">
                 <a:latin typeface="맑은 고딕"/>
               </a:rPr>
-              <a:t>| **033** | e-Claim &amp; 접수             | 온라인 청구 시스템과 접수 프로세스 구현 필요.                                                                          |     |</a:t>
-            </a:r>
-          </a:p>
-          <a:p>
-            <a:r>
-              <a:rPr sz="1200">
-                <a:latin typeface="맑은 고딕"/>
-              </a:rPr>
-              <a:t>| **034** | Re-Claim &amp; 접수            | 기존 청구 또는 접수 내역을 다시 확인하거나 수정할 수 있는 기능 구현 필요.                                             |     |</a:t>
-            </a:r>
-          </a:p>
-          <a:p>
-            <a:r>
-              <a:rPr sz="1200">
-                <a:latin typeface="맑은 고딕"/>
-              </a:rPr>
-              <a:t>| **NHIIS** | 청구기준 개발             | NHISS 관련 청구 기준 및 자동화 로직 구현 필요.                                                                         |     |</a:t>
-            </a:r>
-          </a:p>
-          <a:p>
-            <a:r>
-              <a:rPr sz="1200">
-                <a:latin typeface="맑은 고딕"/>
-              </a:rPr>
-              <a:t>| **NHIIS001** | 포털 사용자 편의사항       | 포털 사용자 경험을 향상시키기 위한 기능 구현 필요 (예: 빠른 검색, 간편 결제 등).                                     |     |</a:t>
-            </a:r>
-          </a:p>
-          <a:p>
-            <a:r>
-              <a:rPr sz="1200">
-                <a:latin typeface="맑은 고딕"/>
-              </a:rPr>
-              <a:t>| **NHIIS002** | e-Claim &amp; 접수             | 온라인 청구 시스템 및 접수 프로세스 구축 필요.                                                                         |     |</a:t>
+              <a:t>- **기술적 제약**: 기존 시스템 호환성, 기술 스택 제한 등</a:t>
+            </a:r>
+          </a:p>
+          <a:p>
+            <a:r>
+              <a:rPr sz="1200">
+                <a:latin typeface="맑은 고딕"/>
+              </a:rPr>
+              <a:t>- **법적 제약**: 관련 법규 준수 요구사항</a:t>
+            </a:r>
+          </a:p>
+          <a:p>
+            <a:r>
+              <a:rPr sz="1200">
+                <a:latin typeface="맑은 고딕"/>
+              </a:rPr>
+              <a:t>- **인적 제약**: 핵심 인력 확보 가능 여부 및 역량 평가</a:t>
+            </a:r>
+          </a:p>
+          <a:p/>
+          <a:p>
+            <a:r>
+              <a:rPr sz="1200">
+                <a:latin typeface="맑은 고딕"/>
+              </a:rPr>
+              <a:t>| **항목**          | **세부 내용**                                                   | **예상 개수** |</a:t>
+            </a:r>
+          </a:p>
+          <a:p>
+            <a:r>
+              <a:rPr sz="1200">
+                <a:latin typeface="맑은 고딕"/>
+              </a:rPr>
+              <a:t>|-------------------|-----------------------------------------------------------------|--------------|</a:t>
+            </a:r>
+          </a:p>
+          <a:p>
+            <a:r>
+              <a:rPr sz="1200">
+                <a:latin typeface="맑은 고딕"/>
+              </a:rPr>
+              <a:t>| **기술적 제약**   | 기존 시스템 연동 문제 해결 방안                               |              |</a:t>
+            </a:r>
+          </a:p>
+          <a:p>
+            <a:r>
+              <a:rPr sz="1200">
+                <a:latin typeface="맑은 고딕"/>
+              </a:rPr>
+              <a:t>| **법적 제약**     | 관련 법규 준수 계획 및 문서화                                  |              |</a:t>
+            </a:r>
+          </a:p>
+          <a:p>
+            <a:r>
+              <a:rPr sz="1200">
+                <a:latin typeface="맑은 고딕"/>
+              </a:rPr>
+              <a:t>| **인적 제약**     | 핵심 인력 역량 평가 및 확보 가능성 검토                         |              |</a:t>
+            </a:r>
+          </a:p>
+          <a:p>
+            <a:r>
+              <a:rPr sz="1200">
+                <a:latin typeface="맑은 고딕"/>
+              </a:rPr>
+              <a:t>| **총계**          | **---**                                                          | **3**        |</a:t>
+            </a:r>
+          </a:p>
+          <a:p/>
+          <a:p>
+            <a:r>
+              <a:rPr sz="1200">
+                <a:latin typeface="맑은 고딕"/>
+              </a:rPr>
+              <a:t>이 표는 바레인 건강보험 시스템 구축 프로젝트를 위한 포괄적인 요구사항 목록을 제공하며, 각 항목별로 구체적인 세부 사항과 기대되는 결과를 명확히 기술하였습니다. 이를 바탕으로 제안서 작성 및 입찰 준비에 활용하시면 좋겠습니다.</a:t>
             </a:r>
           </a:p>
         </p:txBody>
@@ -5035,6 +4877,139 @@
               <a:rPr sz="1800">
                 <a:latin typeface="맑은 고딕"/>
               </a:rPr>
+              <a:t>제안요청사항 - 요구사항 목록</a:t>
+            </a:r>
+          </a:p>
+        </p:txBody>
+      </p:sp>
+      <p:sp>
+        <p:nvSpPr>
+          <p:cNvPr id="3" name="Content Placeholder 2"/>
+          <p:cNvSpPr>
+            <a:spLocks noGrp="1"/>
+          </p:cNvSpPr>
+          <p:nvPr>
+            <p:ph idx="1"/>
+          </p:nvPr>
+        </p:nvSpPr>
+        <p:spPr/>
+        <p:txBody>
+          <a:bodyPr/>
+          <a:lstStyle/>
+          <a:p>
+            <a:r>
+              <a:rPr sz="1200">
+                <a:latin typeface="맑은 고딕"/>
+              </a:rPr>
+              <a:t>### 요구사항 목록표 (Markdown Format)</a:t>
+            </a:r>
+          </a:p>
+          <a:p/>
+          <a:p>
+            <a:r>
+              <a:rPr sz="1200">
+                <a:latin typeface="맑은 고딕"/>
+              </a:rPr>
+              <a:t>아래는 주어진 컨텍스트와 요구사항 목록을 마크다운 형식으로 정리한 표입니다. 각 항목은 명확성과 구체성을 유지하기 위해 상세하게 구성되었습니다.</a:t>
+            </a:r>
+          </a:p>
+          <a:p/>
+          <a:p>
+            <a:r>
+              <a:rPr sz="1200">
+                <a:latin typeface="맑은 고딕"/>
+              </a:rPr>
+              <a:t>```markdown</a:t>
+            </a:r>
+          </a:p>
+          <a:p>
+            <a:r>
+              <a:rPr sz="1200">
+                <a:latin typeface="맑은 고딕"/>
+              </a:rPr>
+              <a:t>## 제안 사업 관련 주요 기능 및 요구사항 목록</a:t>
+            </a:r>
+          </a:p>
+          <a:p/>
+          <a:p>
+            <a:r>
+              <a:rPr sz="1200">
+                <a:latin typeface="맑은 고딕"/>
+              </a:rPr>
+              <a:t>### 1. 기능 요구사항 (Function Requirements)</a:t>
+            </a:r>
+          </a:p>
+          <a:p>
+            <a:r>
+              <a:rPr sz="1200">
+                <a:latin typeface="맑은 고딕"/>
+              </a:rPr>
+              <a:t>| **Code** | **요구사항명**                          | **설명**                                                                                           | **수량** |</a:t>
+            </a:r>
+          </a:p>
+          <a:p>
+            <a:r>
+              <a:rPr sz="1200">
+                <a:latin typeface="맑은 고딕"/>
+              </a:rPr>
+              <a:t>|----------|-----------------------------------------|-----------------------------------------------------------------------------------------------------|---------|</a:t>
+            </a:r>
+          </a:p>
+          <a:p>
+            <a:r>
+              <a:rPr sz="1200">
+                <a:latin typeface="맑은 고딕"/>
+              </a:rPr>
+              <a:t>| F001     | 업무 프로세스 설계                        | 체계적인 업무 흐름을 정의하고 구현하여 효율적인 시스템 운영 지원.                                   | 57      |</a:t>
+            </a:r>
+          </a:p>
+          <a:p>
+            <a:r>
+              <a:rPr sz="1200">
+                <a:latin typeface="맑은 고딕"/>
+              </a:rPr>
+              <a:t>| F002     | 공통 기능                             | 일반적으로 모든 사용자가 필요로 하는 기본적인 기능들 (예: 로그인, 로그아웃 등).                    |         |</a:t>
+            </a:r>
+          </a:p>
+        </p:txBody>
+      </p:sp>
+    </p:spTree>
+  </p:cSld>
+  <p:clrMapOvr>
+    <a:masterClrMapping/>
+  </p:clrMapOvr>
+</p:sld>
+</file>
+
+<file path=ppt/slides/slide23.xml><?xml version="1.0" encoding="utf-8"?>
+<p:sld xmlns:a="http://schemas.openxmlformats.org/drawingml/2006/main" xmlns:p="http://schemas.openxmlformats.org/presentationml/2006/main" xmlns:r="http://schemas.openxmlformats.org/officeDocument/2006/relationships">
+  <p:cSld>
+    <p:spTree>
+      <p:nvGrpSpPr>
+        <p:cNvPr id="1" name=""/>
+        <p:cNvGrpSpPr/>
+        <p:nvPr/>
+      </p:nvGrpSpPr>
+      <p:grpSpPr/>
+      <p:sp>
+        <p:nvSpPr>
+          <p:cNvPr id="2" name="Title 1"/>
+          <p:cNvSpPr>
+            <a:spLocks noGrp="1"/>
+          </p:cNvSpPr>
+          <p:nvPr>
+            <p:ph type="title"/>
+          </p:nvPr>
+        </p:nvSpPr>
+        <p:spPr/>
+        <p:txBody>
+          <a:bodyPr/>
+          <a:lstStyle/>
+          <a:p>
+            <a:r>
+              <a:rPr sz="1800">
+                <a:latin typeface="맑은 고딕"/>
+              </a:rPr>
               <a:t>제안요청사항 - 요구사항 목록 (계속)</a:t>
             </a:r>
           </a:p>
@@ -5059,7 +5034,545 @@
               <a:rPr sz="1200">
                 <a:latin typeface="맑은 고딕"/>
               </a:rPr>
-              <a:t>| **NHIIS003** | Re-Claim &amp; 접수            | 기존 청구 또는 접수 내역의 관리 및 수정 기능 구현 필요.                                                               |     |</a:t>
+              <a:t>| F003     | 회원 및 게시판 관리                     | 온라인 커뮤니티나 회원 관리 시스템을 위한 기능 구현.                                                |         |</a:t>
+            </a:r>
+          </a:p>
+          <a:p>
+            <a:r>
+              <a:rPr sz="1200">
+                <a:latin typeface="맑은 고딕"/>
+              </a:rPr>
+              <a:t>| F004     | 권한 관리                              | 사용자별 접근 권한 설정 및 관리 기능 제공.                                                          |         |</a:t>
+            </a:r>
+          </a:p>
+          <a:p>
+            <a:r>
+              <a:rPr sz="1200">
+                <a:latin typeface="맑은 고딕"/>
+              </a:rPr>
+              <a:t>| F005     | 이메일 및 SMS 통합                       | 시스템 내에서 이메일 및 SMS 발송 기능을 통합하여 효율적인 정보 전달 지원.                         |         |</a:t>
+            </a:r>
+          </a:p>
+          <a:p>
+            <a:r>
+              <a:rPr sz="1200">
+                <a:latin typeface="맑은 고딕"/>
+              </a:rPr>
+              <a:t>| F006     | SW 국제화                             | 다양한 언어로 시스템 인터페이스를 현지화하여 글로벌 사용자 지원.                                   |         |</a:t>
+            </a:r>
+          </a:p>
+          <a:p>
+            <a:r>
+              <a:rPr sz="1200">
+                <a:latin typeface="맑은 고딕"/>
+              </a:rPr>
+              <a:t>| **DUR001** | 의약품 수입 내역 보고                     | 의약품의 입고 과정을 상세히 기록하고 보고서 생성 기능 제공.                                      |         |</a:t>
+            </a:r>
+          </a:p>
+        </p:txBody>
+      </p:sp>
+    </p:spTree>
+  </p:cSld>
+  <p:clrMapOvr>
+    <a:masterClrMapping/>
+  </p:clrMapOvr>
+</p:sld>
+</file>
+
+<file path=ppt/slides/slide24.xml><?xml version="1.0" encoding="utf-8"?>
+<p:sld xmlns:a="http://schemas.openxmlformats.org/drawingml/2006/main" xmlns:p="http://schemas.openxmlformats.org/presentationml/2006/main" xmlns:r="http://schemas.openxmlformats.org/officeDocument/2006/relationships">
+  <p:cSld>
+    <p:spTree>
+      <p:nvGrpSpPr>
+        <p:cNvPr id="1" name=""/>
+        <p:cNvGrpSpPr/>
+        <p:nvPr/>
+      </p:nvGrpSpPr>
+      <p:grpSpPr/>
+      <p:sp>
+        <p:nvSpPr>
+          <p:cNvPr id="2" name="Title 1"/>
+          <p:cNvSpPr>
+            <a:spLocks noGrp="1"/>
+          </p:cNvSpPr>
+          <p:nvPr>
+            <p:ph type="title"/>
+          </p:nvPr>
+        </p:nvSpPr>
+        <p:spPr/>
+        <p:txBody>
+          <a:bodyPr/>
+          <a:lstStyle/>
+          <a:p>
+            <a:r>
+              <a:rPr sz="1800">
+                <a:latin typeface="맑은 고딕"/>
+              </a:rPr>
+              <a:t>제안요청사항 - 요구사항 목록 (계속)</a:t>
+            </a:r>
+          </a:p>
+        </p:txBody>
+      </p:sp>
+      <p:sp>
+        <p:nvSpPr>
+          <p:cNvPr id="3" name="Content Placeholder 2"/>
+          <p:cNvSpPr>
+            <a:spLocks noGrp="1"/>
+          </p:cNvSpPr>
+          <p:nvPr>
+            <p:ph idx="1"/>
+          </p:nvPr>
+        </p:nvSpPr>
+        <p:spPr/>
+        <p:txBody>
+          <a:bodyPr/>
+          <a:lstStyle/>
+          <a:p>
+            <a:r>
+              <a:rPr sz="1200">
+                <a:latin typeface="맑은 고딕"/>
+              </a:rPr>
+              <a:t>| **DUR002** | 의약품 공급내역 보고                     | 현재 보유 중인 의약품의 공급 상태를 실시간으로 관리 및 보고하는 시스템 구축.                      |         |</a:t>
+            </a:r>
+          </a:p>
+          <a:p>
+            <a:r>
+              <a:rPr sz="1200">
+                <a:latin typeface="맑은 고딕"/>
+              </a:rPr>
+              <a:t>| **DUR003** | 의약품 입고 내역 보고                     | 의약품이 창고에 도착한 시점 및 세부 정보 기록 기능.                                                |         |</a:t>
+            </a:r>
+          </a:p>
+          <a:p>
+            <a:r>
+              <a:rPr sz="1200">
+                <a:latin typeface="맑은 고딕"/>
+              </a:rPr>
+              <a:t>| **DUR004** | 의약품 사용 내역 보고                     | 의약품의 사용 이력을 추적하고 기록하는 시스템 구축.                                                  |         |</a:t>
+            </a:r>
+          </a:p>
+          <a:p>
+            <a:r>
+              <a:rPr sz="1200">
+                <a:latin typeface="맑은 고딕"/>
+              </a:rPr>
+              <a:t>| **DUR005** | 회수대상 의약품 회수 보고               | 분실 또는 불량 의약품에 대한 회수 절차와 보고 기능 제공.                                            |         |</a:t>
+            </a:r>
+          </a:p>
+          <a:p>
+            <a:r>
+              <a:rPr sz="1200">
+                <a:latin typeface="맑은 고딕"/>
+              </a:rPr>
+              <a:t>| **DUR006** | 보고내역 정정                          | 기존 보고서 수정 및 업데이트 기능 지원.                                                             |         |</a:t>
+            </a:r>
+          </a:p>
+        </p:txBody>
+      </p:sp>
+    </p:spTree>
+  </p:cSld>
+  <p:clrMapOvr>
+    <a:masterClrMapping/>
+  </p:clrMapOvr>
+</p:sld>
+</file>
+
+<file path=ppt/slides/slide25.xml><?xml version="1.0" encoding="utf-8"?>
+<p:sld xmlns:a="http://schemas.openxmlformats.org/drawingml/2006/main" xmlns:p="http://schemas.openxmlformats.org/presentationml/2006/main" xmlns:r="http://schemas.openxmlformats.org/officeDocument/2006/relationships">
+  <p:cSld>
+    <p:spTree>
+      <p:nvGrpSpPr>
+        <p:cNvPr id="1" name=""/>
+        <p:cNvGrpSpPr/>
+        <p:nvPr/>
+      </p:nvGrpSpPr>
+      <p:grpSpPr/>
+      <p:sp>
+        <p:nvSpPr>
+          <p:cNvPr id="2" name="Title 1"/>
+          <p:cNvSpPr>
+            <a:spLocks noGrp="1"/>
+          </p:cNvSpPr>
+          <p:nvPr>
+            <p:ph type="title"/>
+          </p:nvPr>
+        </p:nvSpPr>
+        <p:spPr/>
+        <p:txBody>
+          <a:bodyPr/>
+          <a:lstStyle/>
+          <a:p>
+            <a:r>
+              <a:rPr sz="1800">
+                <a:latin typeface="맑은 고딕"/>
+              </a:rPr>
+              <a:t>제안요청사항 - 요구사항 목록 (계속)</a:t>
+            </a:r>
+          </a:p>
+        </p:txBody>
+      </p:sp>
+      <p:sp>
+        <p:nvSpPr>
+          <p:cNvPr id="3" name="Content Placeholder 2"/>
+          <p:cNvSpPr>
+            <a:spLocks noGrp="1"/>
+          </p:cNvSpPr>
+          <p:nvPr>
+            <p:ph idx="1"/>
+          </p:nvPr>
+        </p:nvSpPr>
+        <p:spPr/>
+        <p:txBody>
+          <a:bodyPr/>
+          <a:lstStyle/>
+          <a:p>
+            <a:r>
+              <a:rPr sz="1200">
+                <a:latin typeface="맑은 고딕"/>
+              </a:rPr>
+              <a:t>| **DUR007** | 보고내역 취소                           | 더 이상 필요하지 않은 보고서를 자동 또는 수동으로 취소할 수 있는 기능 제공.                         |         |</a:t>
+            </a:r>
+          </a:p>
+          <a:p>
+            <a:r>
+              <a:rPr sz="1200">
+                <a:latin typeface="맑은 고딕"/>
+              </a:rPr>
+              <a:t>| **DUR008** | 의약품 주문                             | 온라인 또는 오프라인 채널을 통해 의약품의 구매 주문 시스템 구축.                                  |         |</a:t>
+            </a:r>
+          </a:p>
+          <a:p>
+            <a:r>
+              <a:rPr sz="1200">
+                <a:latin typeface="맑은 고딕"/>
+              </a:rPr>
+              <a:t>| **DUR009** | 의약품 재고 관리                        | 실시간 재고 상태를 모니터링하고 관리하는 시스템 구현.                                               |         |</a:t>
+            </a:r>
+          </a:p>
+          <a:p>
+            <a:r>
+              <a:rPr sz="1200">
+                <a:latin typeface="맑은 고딕"/>
+              </a:rPr>
+              <a:t>| **DUR010** | 마약류 의약품 관리                      | 특수한 관리가 필요한 마약류 의약품의 저장 및 추적 시스템 구축.                                    |         |</a:t>
+            </a:r>
+          </a:p>
+          <a:p>
+            <a:r>
+              <a:rPr sz="1200">
+                <a:latin typeface="맑은 고딕"/>
+              </a:rPr>
+              <a:t>| **DUR011** | 의약품 유통정보 현황 조회               | 의약품의 유통 경로와 상태를 실시간으로 확인 가능한 시스템 제공.                                   |         |</a:t>
+            </a:r>
+          </a:p>
+          <a:p>
+            <a:r>
+              <a:rPr sz="1200">
+                <a:latin typeface="맑은 고딕"/>
+              </a:rPr>
+              <a:t>| **DUR012** | 의약품 정보 검색                         | 사용자가 필요로 하는 의약품에 대한 상세 정보를 빠르게 검색할 수 있는 기능 구현.                    |         |</a:t>
+            </a:r>
+          </a:p>
+        </p:txBody>
+      </p:sp>
+    </p:spTree>
+  </p:cSld>
+  <p:clrMapOvr>
+    <a:masterClrMapping/>
+  </p:clrMapOvr>
+</p:sld>
+</file>
+
+<file path=ppt/slides/slide26.xml><?xml version="1.0" encoding="utf-8"?>
+<p:sld xmlns:a="http://schemas.openxmlformats.org/drawingml/2006/main" xmlns:p="http://schemas.openxmlformats.org/presentationml/2006/main" xmlns:r="http://schemas.openxmlformats.org/officeDocument/2006/relationships">
+  <p:cSld>
+    <p:spTree>
+      <p:nvGrpSpPr>
+        <p:cNvPr id="1" name=""/>
+        <p:cNvGrpSpPr/>
+        <p:nvPr/>
+      </p:nvGrpSpPr>
+      <p:grpSpPr/>
+      <p:sp>
+        <p:nvSpPr>
+          <p:cNvPr id="2" name="Title 1"/>
+          <p:cNvSpPr>
+            <a:spLocks noGrp="1"/>
+          </p:cNvSpPr>
+          <p:nvPr>
+            <p:ph type="title"/>
+          </p:nvPr>
+        </p:nvSpPr>
+        <p:spPr/>
+        <p:txBody>
+          <a:bodyPr/>
+          <a:lstStyle/>
+          <a:p>
+            <a:r>
+              <a:rPr sz="1800">
+                <a:latin typeface="맑은 고딕"/>
+              </a:rPr>
+              <a:t>제안요청사항 - 요구사항 목록 (계속)</a:t>
+            </a:r>
+          </a:p>
+        </p:txBody>
+      </p:sp>
+      <p:sp>
+        <p:nvSpPr>
+          <p:cNvPr id="3" name="Content Placeholder 2"/>
+          <p:cNvSpPr>
+            <a:spLocks noGrp="1"/>
+          </p:cNvSpPr>
+          <p:nvPr>
+            <p:ph idx="1"/>
+          </p:nvPr>
+        </p:nvSpPr>
+        <p:spPr/>
+        <p:txBody>
+          <a:bodyPr/>
+          <a:lstStyle/>
+          <a:p>
+            <a:r>
+              <a:rPr sz="1200">
+                <a:latin typeface="맑은 고딕"/>
+              </a:rPr>
+              <a:t>| **DUR013** | 의약품 안전점검                          | 정기적인 의약품 안전성 검사 및 결과 보고 시스템 구축.                                              |         |</a:t>
+            </a:r>
+          </a:p>
+          <a:p>
+            <a:r>
+              <a:rPr sz="1200">
+                <a:latin typeface="맑은 고딕"/>
+              </a:rPr>
+              <a:t>| **DUR014** | 약국 의약품 재고정보 조회                | 약국별 의약품 재고 상태를 실시간으로 확인하고 관리할 수 있는 기능 제공.                            |         |</a:t>
+            </a:r>
+          </a:p>
+          <a:p>
+            <a:r>
+              <a:rPr sz="1200">
+                <a:latin typeface="맑은 고딕"/>
+              </a:rPr>
+              <a:t>| **DUR015** | 개인별 투약 이력 조회                    | 환자별 약물 투여 기록을 확인 가능한 시스템 구축.                                                    |         |</a:t>
+            </a:r>
+          </a:p>
+          <a:p>
+            <a:r>
+              <a:rPr sz="1200">
+                <a:latin typeface="맑은 고딕"/>
+              </a:rPr>
+              <a:t>| **DUR016** | 의약품 안전점검 현황조회                  | 현재까지 수행된 모든 의약품 안전성 점검 결과를 한눈에 볼 수 있는 대시보드 제공.                   |         |</a:t>
+            </a:r>
+          </a:p>
+          <a:p>
+            <a:r>
+              <a:rPr sz="1200">
+                <a:latin typeface="맑은 고딕"/>
+              </a:rPr>
+              <a:t>| **DUR017** | 의약품 안전점검 기준관리                  | 의약품 안전성 점검을 위한 기준 및 정책 관리 기능 제공.                                             |         |</a:t>
+            </a:r>
+          </a:p>
+        </p:txBody>
+      </p:sp>
+    </p:spTree>
+  </p:cSld>
+  <p:clrMapOvr>
+    <a:masterClrMapping/>
+  </p:clrMapOvr>
+</p:sld>
+</file>
+
+<file path=ppt/slides/slide27.xml><?xml version="1.0" encoding="utf-8"?>
+<p:sld xmlns:a="http://schemas.openxmlformats.org/drawingml/2006/main" xmlns:p="http://schemas.openxmlformats.org/presentationml/2006/main" xmlns:r="http://schemas.openxmlformats.org/officeDocument/2006/relationships">
+  <p:cSld>
+    <p:spTree>
+      <p:nvGrpSpPr>
+        <p:cNvPr id="1" name=""/>
+        <p:cNvGrpSpPr/>
+        <p:nvPr/>
+      </p:nvGrpSpPr>
+      <p:grpSpPr/>
+      <p:sp>
+        <p:nvSpPr>
+          <p:cNvPr id="2" name="Title 1"/>
+          <p:cNvSpPr>
+            <a:spLocks noGrp="1"/>
+          </p:cNvSpPr>
+          <p:nvPr>
+            <p:ph type="title"/>
+          </p:nvPr>
+        </p:nvSpPr>
+        <p:spPr/>
+        <p:txBody>
+          <a:bodyPr/>
+          <a:lstStyle/>
+          <a:p>
+            <a:r>
+              <a:rPr sz="1800">
+                <a:latin typeface="맑은 고딕"/>
+              </a:rPr>
+              <a:t>제안요청사항 - 요구사항 목록 (계속)</a:t>
+            </a:r>
+          </a:p>
+        </p:txBody>
+      </p:sp>
+      <p:sp>
+        <p:nvSpPr>
+          <p:cNvPr id="3" name="Content Placeholder 2"/>
+          <p:cNvSpPr>
+            <a:spLocks noGrp="1"/>
+          </p:cNvSpPr>
+          <p:nvPr>
+            <p:ph idx="1"/>
+          </p:nvPr>
+        </p:nvSpPr>
+        <p:spPr/>
+        <p:txBody>
+          <a:bodyPr/>
+          <a:lstStyle/>
+          <a:p>
+            <a:r>
+              <a:rPr sz="1200">
+                <a:latin typeface="맑은 고딕"/>
+              </a:rPr>
+              <a:t>| **DUR018** | 의약품 처방조제                          | 의사의 처방전에 따른 약물 조제 과정 추적 및 보고 시스템 구축.                                      |         |</a:t>
+            </a:r>
+          </a:p>
+          <a:p>
+            <a:r>
+              <a:rPr sz="1200">
+                <a:latin typeface="맑은 고딕"/>
+              </a:rPr>
+              <a:t>| **DUR019** | 일반의약품 판매관리                        | 약국에서의 일반의약품 판매 활동을 효율적으로 관리하는 기능 제공.                                   |         |</a:t>
+            </a:r>
+          </a:p>
+          <a:p>
+            <a:r>
+              <a:rPr sz="1200">
+                <a:latin typeface="맑은 고딕"/>
+              </a:rPr>
+              <a:t>| **DUR020** | 약국 현황조회                             | 각 약국의 현재 상태와 운영 정보를 실시간으로 확인할 수 있는 시스템 구축.                            |         |</a:t>
+            </a:r>
+          </a:p>
+          <a:p>
+            <a:r>
+              <a:rPr sz="1200">
+                <a:latin typeface="맑은 고딕"/>
+              </a:rPr>
+              <a:t>| **DUR021** | 의약품 유통정보 통계                      | 의약품 유통 관련 다양한 통계 데이터를 제공하고 분석 가능한 시스템 구현.                           |         |</a:t>
+            </a:r>
+          </a:p>
+          <a:p>
+            <a:r>
+              <a:rPr sz="1200">
+                <a:latin typeface="맑은 고딕"/>
+              </a:rPr>
+              <a:t>| **DUR022** | 의약품 안전점검 모니터링 통계            | 실시간으로 의약품 안전성 점검의 진행 상황을 추적하고 모니터링할 수 있는 시스템 구축.               |         |</a:t>
+            </a:r>
+          </a:p>
+          <a:p>
+            <a:r>
+              <a:rPr sz="1200">
+                <a:latin typeface="맑은 고딕"/>
+              </a:rPr>
+              <a:t>| **DUR023** | 약국 의약품 통계                           | 약국별로 수집된 다양한 의약품 관련 데이터를 분석하고 통계화하는 기능 제공.                         |         |</a:t>
+            </a:r>
+          </a:p>
+        </p:txBody>
+      </p:sp>
+    </p:spTree>
+  </p:cSld>
+  <p:clrMapOvr>
+    <a:masterClrMapping/>
+  </p:clrMapOvr>
+</p:sld>
+</file>
+
+<file path=ppt/slides/slide28.xml><?xml version="1.0" encoding="utf-8"?>
+<p:sld xmlns:a="http://schemas.openxmlformats.org/drawingml/2006/main" xmlns:p="http://schemas.openxmlformats.org/presentationml/2006/main" xmlns:r="http://schemas.openxmlformats.org/officeDocument/2006/relationships">
+  <p:cSld>
+    <p:spTree>
+      <p:nvGrpSpPr>
+        <p:cNvPr id="1" name=""/>
+        <p:cNvGrpSpPr/>
+        <p:nvPr/>
+      </p:nvGrpSpPr>
+      <p:grpSpPr/>
+      <p:sp>
+        <p:nvSpPr>
+          <p:cNvPr id="2" name="Title 1"/>
+          <p:cNvSpPr>
+            <a:spLocks noGrp="1"/>
+          </p:cNvSpPr>
+          <p:nvPr>
+            <p:ph type="title"/>
+          </p:nvPr>
+        </p:nvSpPr>
+        <p:spPr/>
+        <p:txBody>
+          <a:bodyPr/>
+          <a:lstStyle/>
+          <a:p>
+            <a:r>
+              <a:rPr sz="1800">
+                <a:latin typeface="맑은 고딕"/>
+              </a:rPr>
+              <a:t>제안요청사항 - 요구사항 목록 (계속)</a:t>
+            </a:r>
+          </a:p>
+        </p:txBody>
+      </p:sp>
+      <p:sp>
+        <p:nvSpPr>
+          <p:cNvPr id="3" name="Content Placeholder 2"/>
+          <p:cNvSpPr>
+            <a:spLocks noGrp="1"/>
+          </p:cNvSpPr>
+          <p:nvPr>
+            <p:ph idx="1"/>
+          </p:nvPr>
+        </p:nvSpPr>
+        <p:spPr/>
+        <p:txBody>
+          <a:bodyPr/>
+          <a:lstStyle/>
+          <a:p>
+            <a:r>
+              <a:rPr sz="1200">
+                <a:latin typeface="맑은 고딕"/>
+              </a:rPr>
+              <a:t>| **DUR024** | 약국 정보시스템 통합                       | 여러 시스템 간의 연동을 통해 효율적인 운영 지원하는 통합 플랫폼 구축.                            |         |</a:t>
+            </a:r>
+          </a:p>
+          <a:p>
+            <a:r>
+              <a:rPr sz="1200">
+                <a:latin typeface="맑은 고딕"/>
+              </a:rPr>
+              <a:t>| **NHIIS001** | 청구서 기준 개발                           | 청구서 생성 및 관리를 위한 체계적인 기준 개발 및 구현.                                            |         |</a:t>
+            </a:r>
+          </a:p>
+          <a:p>
+            <a:r>
+              <a:rPr sz="1200">
+                <a:latin typeface="맑은 고딕"/>
+              </a:rPr>
+              <a:t>| **NHIIS002** | 포털 사용자 편의사항                       | 사용자 친화적인 인터페이스 및 기능 제공을 통한 편의성 증대.                                         |         |</a:t>
+            </a:r>
+          </a:p>
+          <a:p>
+            <a:r>
+              <a:rPr sz="1200">
+                <a:latin typeface="맑은 고딕"/>
+              </a:rPr>
+              <a:t>| **NHIIS003** | e-Claim &amp; 접수                             | 온라인 청구서 제출 및 접수 시스템 구축.                                                           |         |</a:t>
+            </a:r>
+          </a:p>
+          <a:p>
+            <a:r>
+              <a:rPr sz="1200">
+                <a:latin typeface="맑은 고딕"/>
+              </a:rPr>
+              <a:t>| **NHIIS004** | Re-Claim &amp; 접수                           | 재청구 또는 수정된 청구서 처리를 위한 자동화 시스템 구현.                                           |         |</a:t>
             </a:r>
           </a:p>
           <a:p/>
@@ -5068,15 +5581,106 @@
               <a:rPr sz="1200">
                 <a:latin typeface="맑은 고딕"/>
               </a:rPr>
-              <a:t>### 설명</a:t>
-            </a:r>
-          </a:p>
-          <a:p>
-            <a:r>
-              <a:rPr sz="1200">
-                <a:latin typeface="맑은 고딕"/>
-              </a:rPr>
-              <a:t>위 표는 제안된 건강보험 시스템 구축 프로젝트에서 요구되는 핵심 기능들을 분류하여 나열한 것입니다. 각 항목은 명확하고 구체적인 요구사항을 명시하며, 이를 통해 시스템이 원활하게 운영될 수 있도록 설계 및 구현에 초점을 맞추고 있습니다. 마크다운 형식으로 작성함으로써 가독성과 구조화가 용이합니다. 추가로 필요한 사항이나 특정 부분에 대한 자세한 설명이 필요하시다면 언제든지 알려주세요!</a:t>
+              <a:t>### 표 형식 요약</a:t>
+            </a:r>
+          </a:p>
+          <a:p>
+            <a:r>
+              <a:rPr sz="1200">
+                <a:latin typeface="맑은 고딕"/>
+              </a:rPr>
+              <a:t>- **Code**: 각 요구사항을 구분하기 위한 고유 코드 번호</a:t>
+            </a:r>
+          </a:p>
+          <a:p>
+            <a:r>
+              <a:rPr sz="1200">
+                <a:latin typeface="맑은 고딕"/>
+              </a:rPr>
+              <a:t>- **요구사항명**: 구체적인 기능 설명</a:t>
+            </a:r>
+          </a:p>
+        </p:txBody>
+      </p:sp>
+    </p:spTree>
+  </p:cSld>
+  <p:clrMapOvr>
+    <a:masterClrMapping/>
+  </p:clrMapOvr>
+</p:sld>
+</file>
+
+<file path=ppt/slides/slide29.xml><?xml version="1.0" encoding="utf-8"?>
+<p:sld xmlns:a="http://schemas.openxmlformats.org/drawingml/2006/main" xmlns:p="http://schemas.openxmlformats.org/presentationml/2006/main" xmlns:r="http://schemas.openxmlformats.org/officeDocument/2006/relationships">
+  <p:cSld>
+    <p:spTree>
+      <p:nvGrpSpPr>
+        <p:cNvPr id="1" name=""/>
+        <p:cNvGrpSpPr/>
+        <p:nvPr/>
+      </p:nvGrpSpPr>
+      <p:grpSpPr/>
+      <p:sp>
+        <p:nvSpPr>
+          <p:cNvPr id="2" name="Title 1"/>
+          <p:cNvSpPr>
+            <a:spLocks noGrp="1"/>
+          </p:cNvSpPr>
+          <p:nvPr>
+            <p:ph type="title"/>
+          </p:nvPr>
+        </p:nvSpPr>
+        <p:spPr/>
+        <p:txBody>
+          <a:bodyPr/>
+          <a:lstStyle/>
+          <a:p>
+            <a:r>
+              <a:rPr sz="1800">
+                <a:latin typeface="맑은 고딕"/>
+              </a:rPr>
+              <a:t>제안요청사항 - 요구사항 목록 (계속)</a:t>
+            </a:r>
+          </a:p>
+        </p:txBody>
+      </p:sp>
+      <p:sp>
+        <p:nvSpPr>
+          <p:cNvPr id="3" name="Content Placeholder 2"/>
+          <p:cNvSpPr>
+            <a:spLocks noGrp="1"/>
+          </p:cNvSpPr>
+          <p:nvPr>
+            <p:ph idx="1"/>
+          </p:nvPr>
+        </p:nvSpPr>
+        <p:spPr/>
+        <p:txBody>
+          <a:bodyPr/>
+          <a:lstStyle/>
+          <a:p>
+            <a:r>
+              <a:rPr sz="1200">
+                <a:latin typeface="맑은 고딕"/>
+              </a:rPr>
+              <a:t>- **설명**: 해당 기능이 어떻게 구현되어야 하는지 상세하게 기술</a:t>
+            </a:r>
+          </a:p>
+          <a:p>
+            <a:r>
+              <a:rPr sz="1200">
+                <a:latin typeface="맑은 고딕"/>
+              </a:rPr>
+              <a:t>- **수량**: 해당 요구사항의 중요도 또는 우선순위를 나타내는 수치 (예시로 모두 동일한 수로 표기)</a:t>
+            </a:r>
+          </a:p>
+          <a:p/>
+          <a:p>
+            <a:r>
+              <a:rPr sz="1200">
+                <a:latin typeface="맑은 고딕"/>
+              </a:rPr>
+              <a:t>이러한 구조를 통해 제안서에서 각 기능의 구체적인 내용과 기대 효과를 명확하게 전달할 수 있습니다. 필요에 따라 수량은 실제 프로젝트 규모나 복잡성에 맞추어 조정될 수 있습니다.</a:t>
             </a:r>
           </a:p>
         </p:txBody>
@@ -5142,15 +5746,15 @@
               <a:rPr sz="1200">
                 <a:latin typeface="맑은 고딕"/>
               </a:rPr>
-              <a:t>* **디지털 전환 추진:** 바레인 정부는 4차 산업혁명 시대에 맞춰 디지털 기술을 활용한 스마트 헬스케어 시스템 구축을 적극적으로 추진하고 있습니다. SEHATI-ICT 시스템은 최신 웹 기반 기술을 접목하여 효율성을 극대화하고, 데이터 기반 의사 결정 지원 체계를 마련합니다.</a:t>
-            </a:r>
-          </a:p>
-          <a:p>
-            <a:r>
-              <a:rPr sz="1200">
-                <a:latin typeface="맑은 고딕"/>
-              </a:rPr>
-              <a:t>* **데이터 기반 의료 서비스 향상:** 빅데이터 분석 및 인공지능 기술 도입을 통해 질병 예측, 예방 관리, 맞춤형 치료 등 고도화된 의료 서비스 제공이 가능해집니다. SEHATI-ICT 시스템은 이러한 혁신적인 의료 서비스 구현의 기반이 됩니다.</a:t>
+              <a:t>| **효율적인 의료 제도 운영 목표** | - **자원 최적화**: 기존 의료 자원의 불균형 분포 및 중복 투자 문제 해결을 위해 체계적 관리 시스템 필요.&lt;br&gt;- **공정한 접근성 보장**: 모든 국민에게 공평하고 안정적인 의료 서비스 제공을 위한 보편적 보험 제도 도입이 요구됨.&lt;br&gt;- **사회 안전망 구축**: 저소득층 포함 포괄적 사회 안전망 마련을 통해 국가 보건의료 제도의 효율성 향상. |</a:t>
+            </a:r>
+          </a:p>
+          <a:p>
+            <a:r>
+              <a:rPr sz="1200">
+                <a:latin typeface="맑은 고딕"/>
+              </a:rPr>
+              <a:t>| **디지털 전환 촉진 필요성** | - **4차 산업혁명 시대 대응**: 스마트 헬스케어 시스템 구축을 통한 디지털 기술 활용으로 의료 서비스의 질 향상 및 접근성 개선.&lt;br&gt;- **SEHATI-ICT 시스템 도입**: 최신 웹 기반 IT 기술 적용으로 의사결정 지원 체계를 강화하고 효율성 극대화 목표 설정.                                                    |</a:t>
             </a:r>
           </a:p>
           <a:p/>
@@ -5159,7 +5763,7 @@
               <a:rPr sz="1200">
                 <a:latin typeface="맑은 고딕"/>
               </a:rPr>
-              <a:t>**요약 표**</a:t>
+              <a:t>#### 상세 답변 텍스트 형식</a:t>
             </a:r>
           </a:p>
           <a:p/>
@@ -5168,39 +5772,33 @@
               <a:rPr sz="1200">
                 <a:latin typeface="맑은 고딕"/>
               </a:rPr>
-              <a:t>| 구분 | 설명 | 핵심 내용 |</a:t>
-            </a:r>
-          </a:p>
-          <a:p>
-            <a:r>
-              <a:rPr sz="1200">
-                <a:latin typeface="맑은 고딕"/>
-              </a:rPr>
-              <a:t>|---|---|---|</a:t>
-            </a:r>
-          </a:p>
-          <a:p>
-            <a:r>
-              <a:rPr sz="1200">
-                <a:latin typeface="맑은 고딕"/>
-              </a:rPr>
-              <a:t>| **사회적 필요성** | 고령화 사회, 만성 질환 증가, 의료비 부담 증대 | 국민 건강 증진 및 의료비 효율성 제고 필요성 강조 |</a:t>
-            </a:r>
-          </a:p>
-          <a:p>
-            <a:r>
-              <a:rPr sz="1200">
-                <a:latin typeface="맑은 고딕"/>
-              </a:rPr>
-              <a:t>| **제도 개선 목표** | 자원 최적화, 공정한 의료 접근성 확보 | 보편적 보험 제도 도입을 통한 사회 안전망 구축 목표 제시 |</a:t>
-            </a:r>
-          </a:p>
-          <a:p>
-            <a:r>
-              <a:rPr sz="1200">
-                <a:latin typeface="맑은 고딕"/>
-              </a:rPr>
-              <a:t>| **기술 혁신** | 디지털 전환, 데이터 기반 의료 서비스 | SEHATI-ICT 시스템을 통한 스마트 헬스케어 구현 및 고도화된 의료 서비스 제공 가능성 제시 |</a:t>
+              <a:t>**바레인 건강보험시스템 구축 사업 추진배경 요약**</a:t>
+            </a:r>
+          </a:p>
+          <a:p/>
+          <a:p>
+            <a:r>
+              <a:rPr sz="1200">
+                <a:latin typeface="맑은 고딕"/>
+              </a:rPr>
+              <a:t>바레인은 급속한 고령화와 함께 만성 질환자 증가 및 의료비 부담이 심화되는 중요한 사회적 문제에 직면해 있습니다. 이러한 상황을 해결하고 국민의 건강 증진과 경제적 부담 경감을 위해 다음과 같은 주요 배경과 목표가 설정되었습니다:</a:t>
+            </a:r>
+          </a:p>
+          <a:p/>
+          <a:p>
+            <a:r>
+              <a:rPr sz="1200">
+                <a:latin typeface="맑은 고딕"/>
+              </a:rPr>
+              <a:t>1. **사회적 문제 해결**:</a:t>
+            </a:r>
+          </a:p>
+          <a:p>
+            <a:r>
+              <a:rPr sz="1200">
+                <a:latin typeface="맑은 고딕"/>
+              </a:rPr>
+              <a:t>   - **고령화 대응**: 고령화 사회로 진입함에 따라 만성 질환자 수가 증가하면서 의료 시스템의 효율성과 접근성 향상이 시급해졌습니다. 효과적인 건강 관리 시스템 구축은 국민 건강 수준을 개선하고 의료비 부담을 줄이는 데 필수적입니다.</a:t>
             </a:r>
           </a:p>
         </p:txBody>
@@ -5242,7 +5840,7 @@
               <a:rPr sz="1800">
                 <a:latin typeface="맑은 고딕"/>
               </a:rPr>
-              <a:t>사업개요 - 추진목표</a:t>
+              <a:t>사업개요 - 추진배경 (계속)</a:t>
             </a:r>
           </a:p>
         </p:txBody>
@@ -5266,7 +5864,71 @@
               <a:rPr sz="1200">
                 <a:latin typeface="맑은 고딕"/>
               </a:rPr>
-              <a:t>### 바레인 건강보험시스템(SEHATI-ICT) 구축 사업 추진목표 요약</a:t>
+              <a:t>2. **국제 경쟁력 강화**:</a:t>
+            </a:r>
+          </a:p>
+          <a:p>
+            <a:r>
+              <a:rPr sz="1200">
+                <a:latin typeface="맑은 고딕"/>
+              </a:rPr>
+              <a:t>   - **글로벌 위상 유지**: 바레인은 국제 경제 강국으로서의 위상을 유지하며, 이를 위해 선진적인 보건 의료 시스템이 필요합니다. 건강보험 도입을 통해 국제 표준에 부합하는 체계를 구축함으로써 국가 이미지 제고와 글로벌 협력 강화가 가능해집니다.</a:t>
+            </a:r>
+          </a:p>
+          <a:p>
+            <a:r>
+              <a:rPr sz="1200">
+                <a:latin typeface="맑은 고딕"/>
+              </a:rPr>
+              <a:t>   </a:t>
+            </a:r>
+          </a:p>
+          <a:p>
+            <a:r>
+              <a:rPr sz="1200">
+                <a:latin typeface="맑은 고딕"/>
+              </a:rPr>
+              <a:t>3. **효율적인 의료 제도 운영**:</a:t>
+            </a:r>
+          </a:p>
+          <a:p>
+            <a:r>
+              <a:rPr sz="1200">
+                <a:latin typeface="맑은 고딕"/>
+              </a:rPr>
+              <a:t>   - **자원 최적화**: 기존 의료 자원의 불균형 분포와 중복 투자 문제 해결을 위해 체계적이고 효율적인 관리 시스템 도입이 요구됩니다. 예방 중심의 정책을 통해 의료비 지출을 최소화하고자 합니다.</a:t>
+            </a:r>
+          </a:p>
+          <a:p>
+            <a:r>
+              <a:rPr sz="1200">
+                <a:latin typeface="맑은 고딕"/>
+              </a:rPr>
+              <a:t>   - **공정한 접근성 보장**: 모든 계층의 국민에게 공평하고 안정적인 의료 서비스를 제공하기 위한 보편적 보험 제도 구축은 필수적입니다. 특히 저소득층 포함 포괄적 접근으로 사회 안전망 강화가 목표입니다.</a:t>
+            </a:r>
+          </a:p>
+          <a:p>
+            <a:r>
+              <a:rPr sz="1200">
+                <a:latin typeface="맑은 고딕"/>
+              </a:rPr>
+              <a:t>   </a:t>
+            </a:r>
+          </a:p>
+          <a:p>
+            <a:r>
+              <a:rPr sz="1200">
+                <a:latin typeface="맑은 고딕"/>
+              </a:rPr>
+              <a:t>4. **디지털 혁신 촉진**:</a:t>
+            </a:r>
+          </a:p>
+          <a:p>
+            <a:r>
+              <a:rPr sz="1200">
+                <a:latin typeface="맑은 고딕"/>
+              </a:rPr>
+              <a:t>   - **스마트 헬스케어 도입**: 바레인 정부는 4차 산업혁명 시대의 디지털 전환을 주도하고 있으며, 이를 통해 SEHATI-ICT 시스템을 구축하여 최신 웹 기반 기술을 활용한 효율적인 의료 서비스 제공 체계를 마련합니다. 이는 데이터 기반 의사결정 지원 체계를 강화하며, 전체 시스템의 유연성과 접근성을 향상시킵니다.</a:t>
             </a:r>
           </a:p>
           <a:p/>
@@ -5275,97 +5937,7 @@
               <a:rPr sz="1200">
                 <a:latin typeface="맑은 고딕"/>
               </a:rPr>
-              <a:t>#### **1. 추진배경**</a:t>
-            </a:r>
-          </a:p>
-          <a:p>
-            <a:r>
-              <a:rPr sz="1200">
-                <a:latin typeface="맑은 고딕"/>
-              </a:rPr>
-              <a:t>- **양질의 보건의료서비스 제공**: 바레인 정부는 국민들에게 고급 수준의 의료 서비스를 보장하기 위해 노력하고 있습니다. 이는 국민 건강 향상과 사회적 안정성을 강화하는 데 중점이 두어집니다.</a:t>
-            </a:r>
-          </a:p>
-          <a:p>
-            <a:r>
-              <a:rPr sz="1200">
-                <a:latin typeface="맑은 고딕"/>
-              </a:rPr>
-              <a:t>- **효율적인 보건의료제도 운영**: 기존 보건의료 시스템의 개선 및 최적화를 통해 행정 효율성을 높이고, 자원 배분을 더욱 효과적으로 관리하려는 목표가 있습니다.</a:t>
-            </a:r>
-          </a:p>
-          <a:p/>
-          <a:p>
-            <a:r>
-              <a:rPr sz="1200">
-                <a:latin typeface="맑은 고딕"/>
-              </a:rPr>
-              <a:t>#### **2. 추진목표 상세 내용**</a:t>
-            </a:r>
-          </a:p>
-          <a:p>
-            <a:r>
-              <a:rPr sz="1200">
-                <a:latin typeface="맑은 고딕"/>
-              </a:rPr>
-              <a:t>1. **건강보험 제도 도입 체계화**</a:t>
-            </a:r>
-          </a:p>
-          <a:p>
-            <a:r>
-              <a:rPr sz="1200">
-                <a:latin typeface="맑은 고딕"/>
-              </a:rPr>
-              <a:t>   - **신규 건강보험 모델 적용**: 최신 IT 기술을 활용한 Web 기반 시스템 도입으로 기존 보건의료 서비스를 혁신하고 현대화합니다.</a:t>
-            </a:r>
-          </a:p>
-          <a:p>
-            <a:r>
-              <a:rPr sz="1200">
-                <a:latin typeface="맑은 고딕"/>
-              </a:rPr>
-              <a:t>   - **SEHATI 프로그램 실행 계획 구현**: 정부 주도의 세부 실행계획인 SEHATI 프로그램에 따른 제도적 기반 마련과 함께, 디지털 헬스케어 솔루션의 구축을 통해 효율성 향상 및 접근성 증대를 추구합니다.</a:t>
-            </a:r>
-          </a:p>
-          <a:p/>
-          <a:p>
-            <a:r>
-              <a:rPr sz="1200">
-                <a:latin typeface="맑은 고딕"/>
-              </a:rPr>
-              <a:t>2. **첨단 IT 기술 활용**</a:t>
-            </a:r>
-          </a:p>
-          <a:p>
-            <a:r>
-              <a:rPr sz="1200">
-                <a:latin typeface="맑은 고딕"/>
-              </a:rPr>
-              <a:t>   - **클라우드 컴퓨팅 도입**: AWS (Amazon Web Services) 등 클라우드 플랫폼을 활용하여 시스템 확장성 및 안정성 확보.</a:t>
-            </a:r>
-          </a:p>
-          <a:p>
-            <a:r>
-              <a:rPr sz="1200">
-                <a:latin typeface="맑은 고딕"/>
-              </a:rPr>
-              <a:t>   - **서버 구성 최적화**: LINUX 기반 서버 구조와 고성능 하드웨어 도입으로 시스템의 안정성과 성능 향상을 도모합니다. 구체적으로는 다음과 같은 구성 요소들이 포함됩니다:</a:t>
-            </a:r>
-          </a:p>
-          <a:p>
-            <a:r>
-              <a:rPr sz="1200">
-                <a:latin typeface="맑은 고딕"/>
-              </a:rPr>
-              <a:t>     - **Linux 서버**: 24개 (CPU 코어 수 기준)</a:t>
-            </a:r>
-          </a:p>
-          <a:p>
-            <a:r>
-              <a:rPr sz="1200">
-                <a:latin typeface="맑은 고딕"/>
-              </a:rPr>
-              <a:t>     - **Internal Service**: 24개</a:t>
+              <a:t>이러한 배경들은 바레인이 건강보험시스템을 통해 국가 보건의료 제도의 전반적인 발전과 국민의 삶의 질 향상에 초점을 맞추고 있음을 보여줍니다.</a:t>
             </a:r>
           </a:p>
         </p:txBody>
@@ -5407,7 +5979,7 @@
               <a:rPr sz="1800">
                 <a:latin typeface="맑은 고딕"/>
               </a:rPr>
-              <a:t>사업개요 - 추진목표 (계속)</a:t>
+              <a:t>사업개요 - 추진목표</a:t>
             </a:r>
           </a:p>
         </p:txBody>
@@ -5431,111 +6003,7 @@
               <a:rPr sz="1200">
                 <a:latin typeface="맑은 고딕"/>
               </a:rPr>
-              <a:t>- **내부 비즈니스 관리 시스템**: 1개</a:t>
-            </a:r>
-          </a:p>
-          <a:p>
-            <a:r>
-              <a:rPr sz="1200">
-                <a:latin typeface="맑은 고딕"/>
-              </a:rPr>
-              <a:t>       - **웹 및 애플리케이션 서버**: 각각 24개씩, 총합 48개</a:t>
-            </a:r>
-          </a:p>
-          <a:p>
-            <a:r>
-              <a:rPr sz="1200">
-                <a:latin typeface="맑은 고딕"/>
-              </a:rPr>
-              <a:t>       - **데이터베이스**: 각각 21개 (NEMR Repository: 2개, Business Intelligence System: 2개, External Service DB: 2개 포함)</a:t>
-            </a:r>
-          </a:p>
-          <a:p>
-            <a:r>
-              <a:rPr sz="1200">
-                <a:latin typeface="맑은 고딕"/>
-              </a:rPr>
-              <a:t>     - **External Service**: </a:t>
-            </a:r>
-          </a:p>
-          <a:p>
-            <a:r>
-              <a:rPr sz="1200">
-                <a:latin typeface="맑은 고딕"/>
-              </a:rPr>
-              <a:t>       - **약물 안전성 검사 시스템**: 14개 (웹 및 애플리케이션 서버와 데이터베이스 포함)</a:t>
-            </a:r>
-          </a:p>
-          <a:p>
-            <a:r>
-              <a:rPr sz="1200">
-                <a:latin typeface="맑은 고딕"/>
-              </a:rPr>
-              <a:t>     - **기타 서비스**:</a:t>
-            </a:r>
-          </a:p>
-          <a:p>
-            <a:r>
-              <a:rPr sz="1200">
-                <a:latin typeface="맑은 고딕"/>
-              </a:rPr>
-              <a:t>       - **SEHATI 포털 시스템**: 24개</a:t>
-            </a:r>
-          </a:p>
-          <a:p>
-            <a:r>
-              <a:rPr sz="1200">
-                <a:latin typeface="맑은 고딕"/>
-              </a:rPr>
-              <a:t>       - **인터페이스 시스템**: 24개</a:t>
-            </a:r>
-          </a:p>
-          <a:p>
-            <a:r>
-              <a:rPr sz="1200">
-                <a:latin typeface="맑은 고딕"/>
-              </a:rPr>
-              <a:t>       - **통합 관리 콘솔**: 14개</a:t>
-            </a:r>
-          </a:p>
-          <a:p>
-            <a:r>
-              <a:rPr sz="1200">
-                <a:latin typeface="맑은 고딕"/>
-              </a:rPr>
-              <a:t>       - **개발 서버**: 18개</a:t>
-            </a:r>
-          </a:p>
-          <a:p>
-            <a:r>
-              <a:rPr sz="1200">
-                <a:latin typeface="맑은 고딕"/>
-              </a:rPr>
-              <a:t>       - **검증 서버**: 18개</a:t>
-            </a:r>
-          </a:p>
-          <a:p>
-            <a:r>
-              <a:rPr sz="1200">
-                <a:latin typeface="맑은 고딕"/>
-              </a:rPr>
-              <a:t>       - **ETL 서버**: 18개 (8GB 메모리)</a:t>
-            </a:r>
-          </a:p>
-          <a:p>
-            <a:r>
-              <a:rPr sz="1200">
-                <a:latin typeface="맑은 고딕"/>
-              </a:rPr>
-              <a:t>       - **형상관리 서버**: 18개</a:t>
-            </a:r>
-          </a:p>
-          <a:p>
-            <a:r>
-              <a:rPr sz="1200">
-                <a:latin typeface="맑은 고딕"/>
-              </a:rPr>
-              <a:t>     - **스토리지**: NAS Gateway 포함, 총 물리 용량 33.9TB 이상, 가용 용량 15.7TB 이상의 저장 공간 확보</a:t>
+              <a:t>### 바레인 건강보험시스템 구축 사업 추진목표 요약</a:t>
             </a:r>
           </a:p>
           <a:p/>
@@ -5544,23 +6012,7 @@
               <a:rPr sz="1200">
                 <a:latin typeface="맑은 고딕"/>
               </a:rPr>
-              <a:t>3. **지속 가능한 유지보수 체계 구축**</a:t>
-            </a:r>
-          </a:p>
-          <a:p>
-            <a:r>
-              <a:rPr sz="1200">
-                <a:latin typeface="맑은 고딕"/>
-              </a:rPr>
-              <a:t>   - **유지보수 기간**: 사업 완료 후 6개월간 유지보수 수행</a:t>
-            </a:r>
-          </a:p>
-          <a:p>
-            <a:r>
-              <a:rPr sz="1200">
-                <a:latin typeface="맑은 고딕"/>
-              </a:rPr>
-              <a:t>   - **하자 보수 기간**: 하자 발생 시 최소 1년 동안 보장을 제공하여 시스템 안정성과 신뢰성 강화</a:t>
+              <a:t>#### **사업 개요 및 추진배경**</a:t>
             </a:r>
           </a:p>
           <a:p/>
@@ -5569,7 +6021,66 @@
               <a:rPr sz="1200">
                 <a:latin typeface="맑은 고딕"/>
               </a:rPr>
-              <a:t>#### **표로 정리한 추진목표 요약**</a:t>
+              <a:t>바레인의 건강보험 시스템 구축 사업, 특히 **SEHATI-ICT (Smart Healthcare Integrated Technology Platform) 시스템** 구축은 다음과 같은 주요 목표를 중심으로 진행되고 있습니다:</a:t>
+            </a:r>
+          </a:p>
+          <a:p/>
+          <a:p>
+            <a:r>
+              <a:rPr sz="1200">
+                <a:latin typeface="맑은 고딕"/>
+              </a:rPr>
+              <a:t>1. **양질의 보건의료서비스 제공**</a:t>
+            </a:r>
+          </a:p>
+          <a:p>
+            <a:r>
+              <a:rPr sz="1200">
+                <a:latin typeface="맑은 고딕"/>
+              </a:rPr>
+              <a:t>   - **건강 증진 및 의료비 효율성 제고**: 고령화 사회에 대응하여 만성 질환 관리와 예방 중심의 의료 서비스를 강화합니다. 이를 통해 국민 건강 수준을 향상시키고, 의료비 부담을 최소화하려 합니다.</a:t>
+            </a:r>
+          </a:p>
+          <a:p>
+            <a:r>
+              <a:rPr sz="1200">
+                <a:latin typeface="맑은 고딕"/>
+              </a:rPr>
+              <a:t>   - **국제 경쟁력 강화**: 선진 보건의료 시스템 구축을 통해 국제 표준에 부합하는 국가 이미지를 제고하고 글로벌 경제 강국으로서의 위상을 유지합니다.</a:t>
+            </a:r>
+          </a:p>
+          <a:p/>
+          <a:p>
+            <a:r>
+              <a:rPr sz="1200">
+                <a:latin typeface="맑은 고딕"/>
+              </a:rPr>
+              <a:t>2. **효율적인 보건의료제도 운영**</a:t>
+            </a:r>
+          </a:p>
+          <a:p>
+            <a:r>
+              <a:rPr sz="1200">
+                <a:latin typeface="맑은 고딕"/>
+              </a:rPr>
+              <a:t>   - **자원 최적화**: 기존 의료 자원의 불균형 분포와 중복 투자 문제를 해결하여 자원을 효율적으로 배분합니다. 예방 중심의 정책을 통해 장기적으로 의료 비용을 절감하고자 합니다.</a:t>
+            </a:r>
+          </a:p>
+          <a:p>
+            <a:r>
+              <a:rPr sz="1200">
+                <a:latin typeface="맑은 고딕"/>
+              </a:rPr>
+              <a:t>   - **공정한 접근성 보장**: 모든 계층이 공평하게 고품질의 의료 서비스에 접근할 수 있도록 보편적인 건강보험 제도를 도입합니다. 특히 저소득층 지원 강화를 통해 사회 안전망을 확충합니다.</a:t>
+            </a:r>
+          </a:p>
+          <a:p/>
+          <a:p>
+            <a:r>
+              <a:rPr sz="1200">
+                <a:latin typeface="맑은 고딕"/>
+              </a:rPr>
+              <a:t>#### **구체적 추진목표 상세 내용**</a:t>
             </a:r>
           </a:p>
         </p:txBody>
@@ -5635,55 +6146,31 @@
               <a:rPr sz="1200">
                 <a:latin typeface="맑은 고딕"/>
               </a:rPr>
-              <a:t>| 목표 영역                 | 세부 내용                                                                                   |</a:t>
-            </a:r>
-          </a:p>
-          <a:p>
-            <a:r>
-              <a:rPr sz="1200">
-                <a:latin typeface="맑은 고딕"/>
-              </a:rPr>
-              <a:t>|---------------------------|-------------------------------------------------------------------------------------------|</a:t>
-            </a:r>
-          </a:p>
-          <a:p>
-            <a:r>
-              <a:rPr sz="1200">
-                <a:latin typeface="맑은 고딕"/>
-              </a:rPr>
-              <a:t>| **건강보험 제도 도입**     | - 최신 IT 기술 기반 Web 시스템 도입 &lt;br&gt;- SEHATI 프로그램 실행 계획 구현                      |</a:t>
-            </a:r>
-          </a:p>
-          <a:p>
-            <a:r>
-              <a:rPr sz="1200">
-                <a:latin typeface="맑은 고딕"/>
-              </a:rPr>
-              <a:t>| **첨단 기술 활용**        | - 클라우드 컴퓨팅 (AWS) 활용 &lt;br&gt;- 고성능 LINUX 서버 구조 및 하드웨어 구성 최적화            |</a:t>
-            </a:r>
-          </a:p>
-          <a:p>
-            <a:r>
-              <a:rPr sz="1200">
-                <a:latin typeface="맑은 고딕"/>
-              </a:rPr>
-              <a:t>|                           | - 내부/외부 서비스 서버 및 데이터베이스 구축                                                |</a:t>
-            </a:r>
-          </a:p>
-          <a:p>
-            <a:r>
-              <a:rPr sz="1200">
-                <a:latin typeface="맑은 고딕"/>
-              </a:rPr>
-              <a:t>|                           | - 스토리지 용량 및 NAS Gateway 포함                                                            |</a:t>
-            </a:r>
-          </a:p>
-          <a:p>
-            <a:r>
-              <a:rPr sz="1200">
-                <a:latin typeface="맑은 고딕"/>
-              </a:rPr>
-              <a:t>| **유지보수 체계**         | - 완료 후 유지보수 (6개월) &lt;br&gt;- 하자 보수 기간 보장 (1년 이상)                              |</a:t>
+              <a:t>| **추진 목표 항목** | **세부 내용**                                                                                           | **핵심 요약**                                                                                       |</a:t>
+            </a:r>
+          </a:p>
+          <a:p>
+            <a:r>
+              <a:rPr sz="1200">
+                <a:latin typeface="맑은 고딕"/>
+              </a:rPr>
+              <a:t>|--------------------|-------------------------------------------------------------------------------------------------------|-----------------------------------------------------------------------------------------------------|</a:t>
+            </a:r>
+          </a:p>
+          <a:p>
+            <a:r>
+              <a:rPr sz="1200">
+                <a:latin typeface="맑은 고딕"/>
+              </a:rPr>
+              <a:t>| **건강 서비스 향상** | - 고급 수준의 예방 및 진단 시스템 도입&lt;br&gt;- 빅데이터와 인공지능 활용한 질병 예측 및 개인화 치료 제공         | 국민 건강 증진과 의료비 효율성 증대를 위한 고도화된 의료 서비스 구축                                  |</a:t>
+            </a:r>
+          </a:p>
+          <a:p>
+            <a:r>
+              <a:rPr sz="1200">
+                <a:latin typeface="맑은 고딕"/>
+              </a:rPr>
+              <a:t>| **시스템 효율성** | - 기존 의료 자원 최적화 및 중복 투자 최소화&lt;br&gt;- 중앙 집중 관리 시스템을 통한 행정 효율성 제고           | 자원 배분의 효과적인 최적화와 운영 체계 개선으로 보건의료 제도의 전반적인 효율성 향상                 |</a:t>
             </a:r>
           </a:p>
         </p:txBody>
@@ -5749,7 +6236,33 @@
               <a:rPr sz="1200">
                 <a:latin typeface="맑은 고딕"/>
               </a:rPr>
-              <a:t>이러한 추진목표는 바레인의 보건의료 시스템을 현대화하고 효율성을 극대화하며, 장기적인 안정성과 지속 가능성 확보에 중점을 두고 있습니다.</a:t>
+              <a:t>| **공정한 접근성** | - 보편적 건강보험 제도 도입으로 모든 국민에게 안정적인 의료 서비스 제공&lt;br&gt;- 저소득층 지원 강화             | 사회적 안전망 확대를 통한 공정하고 포괄적인 의료 접근성 보장                                             |</a:t>
+            </a:r>
+          </a:p>
+          <a:p>
+            <a:r>
+              <a:rPr sz="1200">
+                <a:latin typeface="맑은 고딕"/>
+              </a:rPr>
+              <a:t>| **기술 혁신**     | - 최신 웹 기반 기술(SEHATI-ICT) 적용&lt;br&gt;- 빅데이터 및 AI 기반 의사 결정 지원 시스템 구축                     | 디지털 전환을 통해 스마트 헬스케어 환경 조성 및 고도화된 의료 서비스 제공의 기반 마련                     |</a:t>
+            </a:r>
+          </a:p>
+          <a:p/>
+          <a:p>
+            <a:r>
+              <a:rPr sz="1200">
+                <a:latin typeface="맑은 고딕"/>
+              </a:rPr>
+              <a:t>### 요약 표 (추진목표 요약)</a:t>
+            </a:r>
+          </a:p>
+          <a:p/>
+          <a:p>
+            <a:r>
+              <a:rPr sz="1200">
+                <a:latin typeface="맑은 고딕"/>
+              </a:rPr>
+              <a:t>| **항목**                         | **세부 내용**                                                                                     | **핵심 요약**                                                                       |</a:t>
             </a:r>
           </a:p>
         </p:txBody>
@@ -5791,7 +6304,7 @@
               <a:rPr sz="1800">
                 <a:latin typeface="맑은 고딕"/>
               </a:rPr>
-              <a:t>제안요청사항 - 요구사항 총괄</a:t>
+              <a:t>사업개요 - 추진목표 (계속)</a:t>
             </a:r>
           </a:p>
         </p:txBody>
@@ -5815,136 +6328,31 @@
               <a:rPr sz="1200">
                 <a:latin typeface="맑은 고딕"/>
               </a:rPr>
-              <a:t>### 요구사항 총괄표</a:t>
-            </a:r>
-          </a:p>
-          <a:p/>
-          <a:p>
-            <a:r>
-              <a:rPr sz="1200">
-                <a:latin typeface="맑은 고딕"/>
-              </a:rPr>
-              <a:t>#### 1. 기능 요구사항 (Functional Requirements)</a:t>
-            </a:r>
-          </a:p>
-          <a:p>
-            <a:r>
-              <a:rPr sz="1200">
-                <a:latin typeface="맑은 고딕"/>
-              </a:rPr>
-              <a:t>- **기능**: 시스템의 핵심적인 작동 기능들을 명시합니다.</a:t>
-            </a:r>
-          </a:p>
-          <a:p>
-            <a:r>
-              <a:rPr sz="1200">
-                <a:latin typeface="맑은 고딕"/>
-              </a:rPr>
-              <a:t>  - **요구사항 번호**: FR01</a:t>
-            </a:r>
-          </a:p>
-          <a:p>
-            <a:r>
-              <a:rPr sz="1200">
-                <a:latin typeface="맑은 고딕"/>
-              </a:rPr>
-              <a:t>    - **설명**: 사용자 인증 및 권한 관리 시스템 구현 - 요양기관, 국민, 의약품 공급업체 등 다양한 사용자 유형에 따른 세분화된 접근 권한 설정 및 관리.</a:t>
-            </a:r>
-          </a:p>
-          <a:p>
-            <a:r>
-              <a:rPr sz="1200">
-                <a:latin typeface="맑은 고딕"/>
-              </a:rPr>
-              <a:t>      - **세부 내용**: </a:t>
-            </a:r>
-          </a:p>
-          <a:p>
-            <a:r>
-              <a:rPr sz="1200">
-                <a:latin typeface="맑은 고딕"/>
-              </a:rPr>
-              <a:t>        - 내부 비즈니스 관리 시스템(Internal Business Management System) 통합을 통한 자동 권한 부여, 수정 및 삭제 기능 제공.</a:t>
-            </a:r>
-          </a:p>
-          <a:p>
-            <a:r>
-              <a:rPr sz="1200">
-                <a:latin typeface="맑은 고딕"/>
-              </a:rPr>
-              <a:t>        - 각 사용자 유형별 역할 기반 접근 제어 모델 구현 (예: RACI 매트릭스 활용).</a:t>
-            </a:r>
-          </a:p>
-          <a:p>
-            <a:r>
-              <a:rPr sz="1200">
-                <a:latin typeface="맑은 고딕"/>
-              </a:rPr>
-              <a:t>    - **요구사항 번호**: FR02</a:t>
-            </a:r>
-          </a:p>
-          <a:p>
-            <a:r>
-              <a:rPr sz="1200">
-                <a:latin typeface="맑은 고딕"/>
-              </a:rPr>
-              <a:t>      - **설명**: 이메일 및 SMS 알림 시스템 구축 - 접수 현황 및 중요 알림 메시지 전송을 위한 자동화된 이메일 및 SMS 서비스 제공.</a:t>
-            </a:r>
-          </a:p>
-          <a:p>
-            <a:r>
-              <a:rPr sz="1200">
-                <a:latin typeface="맑은 고딕"/>
-              </a:rPr>
-              <a:t>        - **세부 내용**:</a:t>
-            </a:r>
-          </a:p>
-          <a:p>
-            <a:r>
-              <a:rPr sz="1200">
-                <a:latin typeface="맑은 고딕"/>
-              </a:rPr>
-              <a:t>          - 웹메일 통보서와 SMS 게이트웨이 통합 기능 구현.</a:t>
-            </a:r>
-          </a:p>
-          <a:p>
-            <a:r>
-              <a:rPr sz="1200">
-                <a:latin typeface="맑은 고딕"/>
-              </a:rPr>
-              <a:t>          - 자동화된 프로세스를 통해 사용자별 맞춤형 알림 설정 및 관리 가능하도록 설계.</a:t>
-            </a:r>
-          </a:p>
-          <a:p>
-            <a:r>
-              <a:rPr sz="1200">
-                <a:latin typeface="맑은 고딕"/>
-              </a:rPr>
-              <a:t>    - **요구사항 번호**: FR03</a:t>
-            </a:r>
-          </a:p>
-          <a:p>
-            <a:r>
-              <a:rPr sz="1200">
-                <a:latin typeface="맑은 고딕"/>
-              </a:rPr>
-              <a:t>      - **설명**: 시스템 국제화 지원 - 다양한 언어 환경에 적합한 UI/UX 디자인 제공 및 데이터 처리의 다국어 지원.</a:t>
-            </a:r>
-          </a:p>
-          <a:p>
-            <a:r>
-              <a:rPr sz="1200">
-                <a:latin typeface="맑은 고딕"/>
-              </a:rPr>
-              <a:t>        - **세부 내용**:</a:t>
-            </a:r>
-          </a:p>
-          <a:p>
-            <a:r>
-              <a:rPr sz="1200">
-                <a:latin typeface="맑은 고딕"/>
-              </a:rPr>
-              <a:t>          - 다국어 지원을 위한 locales 파일 구성 및 동적 리소스 로드 기능 구현.</a:t>
+              <a:t>|----------------------------------|----------------------------------------------------------------------------------------------------|--------------------------------------------------------------------------------------|</a:t>
+            </a:r>
+          </a:p>
+          <a:p>
+            <a:r>
+              <a:rPr sz="1200">
+                <a:latin typeface="맑은 고딕"/>
+              </a:rPr>
+              <a:t>| **건강 서비스 향상**             | 고급 예방 및 진단 시스템 도입, 빅데이터와 AI 기반 개인화 치료 제공                             | 국민 건강 증진 및 의료비 절감을 위한 고도화된 의료 서비스 구현                        |</a:t>
+            </a:r>
+          </a:p>
+          <a:p>
+            <a:r>
+              <a:rPr sz="1200">
+                <a:latin typeface="맑은 고딕"/>
+              </a:rPr>
+              <a:t>| **시스템 효율성**               | 자원 최적화 및 행정 효율성 제고                                                             | 기존 보건의료 시스템의 효율적 관리 및 운영 체계 개선                                  |</a:t>
+            </a:r>
+          </a:p>
+          <a:p>
+            <a:r>
+              <a:rPr sz="1200">
+                <a:latin typeface="맑은 고딕"/>
+              </a:rPr>
+              <a:t>| **공정한 접근성**              | 보편적 보험 제도 도입, 저소득층 지원 강화                                                     | 모든 계층에게 공평하고 안정적인 의료 서비스 제공을 통한 사회 안전망 확대               |</a:t>
             </a:r>
           </a:p>
         </p:txBody>
@@ -5986,7 +6394,7 @@
               <a:rPr sz="1800">
                 <a:latin typeface="맑은 고딕"/>
               </a:rPr>
-              <a:t>제안요청사항 - 요구사항 총괄 (계속)</a:t>
+              <a:t>사업개요 - 추진목표 (계속)</a:t>
             </a:r>
           </a:p>
         </p:txBody>
@@ -6010,7 +6418,7 @@
               <a:rPr sz="1200">
                 <a:latin typeface="맑은 고딕"/>
               </a:rPr>
-              <a:t>- 사용자 인터페이스의 지역화 옵션 설정 및 자동 번역 기능 포함.</a:t>
+              <a:t>| **기술 혁신**                   | SEHATI-ICT 시스템 구축 (웹 기반 기술 활용), 빅데이터 및 AI 기반 의사결정 지원                     | 디지털 전환으로 스마트 헬스케어 환경 구축 및 고도화된 의료 솔루션 제공                |</a:t>
             </a:r>
           </a:p>
           <a:p/>
@@ -6019,103 +6427,7 @@
               <a:rPr sz="1200">
                 <a:latin typeface="맑은 고딕"/>
               </a:rPr>
-              <a:t>#### 2. 시스템 장비 구성 요구사항 (Hardware/Software Requirements)</a:t>
-            </a:r>
-          </a:p>
-          <a:p>
-            <a:r>
-              <a:rPr sz="1200">
-                <a:latin typeface="맑은 고딕"/>
-              </a:rPr>
-              <a:t>- **요구사항 번호**: HR01</a:t>
-            </a:r>
-          </a:p>
-          <a:p>
-            <a:r>
-              <a:rPr sz="1200">
-                <a:latin typeface="맑은 고딕"/>
-              </a:rPr>
-              <a:t>  - **설명**: 필수 하드웨어 및 소프트웨어 환경 정의 - 안정적인 운영을 위한 인프라 요구 사항 명시.</a:t>
-            </a:r>
-          </a:p>
-          <a:p>
-            <a:r>
-              <a:rPr sz="1200">
-                <a:latin typeface="맑은 고딕"/>
-              </a:rPr>
-              <a:t>    - **세부 내용**:</a:t>
-            </a:r>
-          </a:p>
-          <a:p>
-            <a:r>
-              <a:rPr sz="1200">
-                <a:latin typeface="맑은 고딕"/>
-              </a:rPr>
-              <a:t>      - 서버 사양 (CPU, RAM, Storage Capacity 등) 및 운영 체제 요구사항 정의.</a:t>
-            </a:r>
-          </a:p>
-          <a:p>
-            <a:r>
-              <a:rPr sz="1200">
-                <a:latin typeface="맑은 고딕"/>
-              </a:rPr>
-              <a:t>      - 데이터베이스 관리 시스템 선택 및 버전 명시 (예: MySQL, PostgreSQL).</a:t>
-            </a:r>
-          </a:p>
-          <a:p>
-            <a:r>
-              <a:rPr sz="1200">
-                <a:latin typeface="맑은 고딕"/>
-              </a:rPr>
-              <a:t>      - 클라우드 서비스 제공자와의 계약 조건 포함.</a:t>
-            </a:r>
-          </a:p>
-          <a:p>
-            <a:r>
-              <a:rPr sz="1200">
-                <a:latin typeface="맑은 고딕"/>
-              </a:rPr>
-              <a:t>  - **요구사항 번호**: HR02</a:t>
-            </a:r>
-          </a:p>
-          <a:p>
-            <a:r>
-              <a:rPr sz="1200">
-                <a:latin typeface="맑은 고딕"/>
-              </a:rPr>
-              <a:t>    - **설명**: 보안 장비 및 소프트웨어 필요성 - 데이터 보호를 위한 보안 요구사항 명시.</a:t>
-            </a:r>
-          </a:p>
-          <a:p>
-            <a:r>
-              <a:rPr sz="1200">
-                <a:latin typeface="맑은 고딕"/>
-              </a:rPr>
-              <a:t>      - **세부 내용**:</a:t>
-            </a:r>
-          </a:p>
-          <a:p>
-            <a:r>
-              <a:rPr sz="1200">
-                <a:latin typeface="맑은 고딕"/>
-              </a:rPr>
-              <a:t>        - 방화벽 설정 및 업데이트 정책 정의.</a:t>
-            </a:r>
-          </a:p>
-          <a:p>
-            <a:r>
-              <a:rPr sz="1200">
-                <a:latin typeface="맑은 고딕"/>
-              </a:rPr>
-              <a:t>        - 암호화 기술 적용 (예: SSL/TLS, AES).</a:t>
-            </a:r>
-          </a:p>
-          <a:p>
-            <a:r>
-              <a:rPr sz="1200">
-                <a:latin typeface="맑은 고딕"/>
-              </a:rPr>
-              <a:t>        - 정기적인 보안 패치 및 백업 스케줄링 계획 포함.</a:t>
+              <a:t>### 질문에 대한 답변 요약</a:t>
             </a:r>
           </a:p>
           <a:p/>
@@ -6124,39 +6436,58 @@
               <a:rPr sz="1200">
                 <a:latin typeface="맑은 고딕"/>
               </a:rPr>
-              <a:t>#### 3. 성능 요구사항 (Performance Requirements)</a:t>
-            </a:r>
-          </a:p>
-          <a:p>
-            <a:r>
-              <a:rPr sz="1200">
-                <a:latin typeface="맑은 고딕"/>
-              </a:rPr>
-              <a:t>- **요구사항 번호**: PR01</a:t>
-            </a:r>
-          </a:p>
-          <a:p>
-            <a:r>
-              <a:rPr sz="1200">
-                <a:latin typeface="맑은 고딕"/>
-              </a:rPr>
-              <a:t>  - **설명**: 시스템 처리 속도 및 용량 요구 사항 - 응답 시간 및 트래픽 관리 관련 요구사항 명시.</a:t>
-            </a:r>
-          </a:p>
-          <a:p>
-            <a:r>
-              <a:rPr sz="1200">
-                <a:latin typeface="맑은 고딕"/>
-              </a:rPr>
-              <a:t>    - **세부 내용**:</a:t>
-            </a:r>
-          </a:p>
-          <a:p>
-            <a:r>
-              <a:rPr sz="1200">
-                <a:latin typeface="맑은 고딕"/>
-              </a:rPr>
-              <a:t>      - 최대 사용자 동시 접속 수 및 평균 응답 시간 목표 설정 (예: 5초 이내).</a:t>
+              <a:t>**질문: 바레인 사업의 추진목표는 무엇인가요?**</a:t>
+            </a:r>
+          </a:p>
+          <a:p/>
+          <a:p>
+            <a:r>
+              <a:rPr sz="1200">
+                <a:latin typeface="맑은 고딕"/>
+              </a:rPr>
+              <a:t>바레인 건강보험시스템 구축 사업의 주요 추진목표는 다음과 같습니다:</a:t>
+            </a:r>
+          </a:p>
+          <a:p/>
+          <a:p>
+            <a:r>
+              <a:rPr sz="1200">
+                <a:latin typeface="맑은 고딕"/>
+              </a:rPr>
+              <a:t>1. **건강 서비스 향상**: 고급 예방 및 진단 시스템 도입과 빅데이터, AI 기술을 활용한 개인화 치료 제공으로 국민 건강 증진 및 의료비 효율성 제고.</a:t>
+            </a:r>
+          </a:p>
+          <a:p>
+            <a:r>
+              <a:rPr sz="1200">
+                <a:latin typeface="맑은 고딕"/>
+              </a:rPr>
+              <a:t>2. **시스템 효율성**: 의료 자원 최적화와 행정 관리 체계 개선을 통해 보건의료 제도의 운영 효율성 극대화.</a:t>
+            </a:r>
+          </a:p>
+          <a:p>
+            <a:r>
+              <a:rPr sz="1200">
+                <a:latin typeface="맑은 고딕"/>
+              </a:rPr>
+              <a:t>3. **공정한 접근성 보장**: 보편적인 보험 제도 도입과 저소득층 지원 강화로 모든 국민이 공평하고 안정적으로 의료 서비스를 이용할 수 있도록 함.</a:t>
+            </a:r>
+          </a:p>
+          <a:p>
+            <a:r>
+              <a:rPr sz="1200">
+                <a:latin typeface="맑은 고딕"/>
+              </a:rPr>
+              <a:t>4. **기술 혁신**: 최신 웹 기반 기술(SEHATI-ICT)을 활용하여 스마트 헬스케어 환경 구축 및 데이터 기반 의사결정 체계 마련으로 고도화된 의료 서비스 제공 기반 마련.</a:t>
+            </a:r>
+          </a:p>
+          <a:p/>
+          <a:p>
+            <a:r>
+              <a:rPr sz="1200">
+                <a:latin typeface="맑은 고딕"/>
+              </a:rPr>
+              <a:t>이러한 목표들은 바레인의 고령화 사회 문제 해결과 국제 경쟁력 강화를 위해 필수적입니다.</a:t>
             </a:r>
           </a:p>
         </p:txBody>

</xml_diff>